<commit_message>
Lecture 07 more stuff
</commit_message>
<xml_diff>
--- a/Slides/Lecture07.pptx
+++ b/Slides/Lecture07.pptx
@@ -5,20 +5,23 @@
     <p:sldMasterId id="2147484082" r:id="rId4"/>
   </p:sldMasterIdLst>
   <p:notesMasterIdLst>
-    <p:notesMasterId r:id="rId13"/>
+    <p:notesMasterId r:id="rId16"/>
   </p:notesMasterIdLst>
   <p:handoutMasterIdLst>
-    <p:handoutMasterId r:id="rId14"/>
+    <p:handoutMasterId r:id="rId17"/>
   </p:handoutMasterIdLst>
   <p:sldIdLst>
     <p:sldId id="880" r:id="rId5"/>
     <p:sldId id="881" r:id="rId6"/>
     <p:sldId id="882" r:id="rId7"/>
-    <p:sldId id="883" r:id="rId8"/>
-    <p:sldId id="884" r:id="rId9"/>
-    <p:sldId id="885" r:id="rId10"/>
-    <p:sldId id="886" r:id="rId11"/>
-    <p:sldId id="887" r:id="rId12"/>
+    <p:sldId id="890" r:id="rId8"/>
+    <p:sldId id="883" r:id="rId9"/>
+    <p:sldId id="884" r:id="rId10"/>
+    <p:sldId id="885" r:id="rId11"/>
+    <p:sldId id="886" r:id="rId12"/>
+    <p:sldId id="887" r:id="rId13"/>
+    <p:sldId id="888" r:id="rId14"/>
+    <p:sldId id="889" r:id="rId15"/>
   </p:sldIdLst>
   <p:sldSz cx="9326563" cy="6994525"/>
   <p:notesSz cx="6858000" cy="9144000"/>
@@ -125,11 +128,14 @@
             <p14:sldId id="880"/>
             <p14:sldId id="881"/>
             <p14:sldId id="882"/>
+            <p14:sldId id="890"/>
             <p14:sldId id="883"/>
             <p14:sldId id="884"/>
             <p14:sldId id="885"/>
             <p14:sldId id="886"/>
             <p14:sldId id="887"/>
+            <p14:sldId id="888"/>
+            <p14:sldId id="889"/>
           </p14:sldIdLst>
         </p14:section>
       </p14:sectionLst>
@@ -344,7 +350,7 @@
               <a:rPr lang="en-US" smtClean="0">
                 <a:latin typeface="Segoe UI" pitchFamily="34" charset="0"/>
               </a:rPr>
-              <a:t>10/26/2016</a:t>
+              <a:t>10/27/2016</a:t>
             </a:fld>
             <a:endParaRPr lang="en-US" dirty="0">
               <a:latin typeface="Segoe UI" pitchFamily="34" charset="0"/>
@@ -667,7 +673,7 @@
             <a:fld id="{D51B1278-D92B-4AF3-A9C1-71DD298190CE}" type="datetimeFigureOut">
               <a:rPr lang="en-US" smtClean="0"/>
               <a:pPr/>
-              <a:t>10/26/2016</a:t>
+              <a:t>10/27/2016</a:t>
             </a:fld>
             <a:endParaRPr lang="en-US" dirty="0"/>
           </a:p>
@@ -4614,6 +4620,758 @@
 </p:sld>
 </file>
 
+<file path=ppt/slides/slide10.xml><?xml version="1.0" encoding="utf-8"?>
+<p:sld xmlns:a="http://schemas.openxmlformats.org/drawingml/2006/main" xmlns:r="http://schemas.openxmlformats.org/officeDocument/2006/relationships" xmlns:p="http://schemas.openxmlformats.org/presentationml/2006/main">
+  <p:cSld>
+    <p:spTree>
+      <p:nvGrpSpPr>
+        <p:cNvPr id="1" name=""/>
+        <p:cNvGrpSpPr/>
+        <p:nvPr/>
+      </p:nvGrpSpPr>
+      <p:grpSpPr>
+        <a:xfrm>
+          <a:off x="0" y="0"/>
+          <a:ext cx="0" cy="0"/>
+          <a:chOff x="0" y="0"/>
+          <a:chExt cx="0" cy="0"/>
+        </a:xfrm>
+      </p:grpSpPr>
+      <p:sp>
+        <p:nvSpPr>
+          <p:cNvPr id="2" name="Pladsholder til indhold 2"/>
+          <p:cNvSpPr txBox="1">
+            <a:spLocks/>
+          </p:cNvSpPr>
+          <p:nvPr/>
+        </p:nvSpPr>
+        <p:spPr>
+          <a:xfrm>
+            <a:off x="273844" y="1212850"/>
+            <a:ext cx="8778875" cy="5393338"/>
+          </a:xfrm>
+          <a:prstGeom prst="rect">
+            <a:avLst/>
+          </a:prstGeom>
+        </p:spPr>
+        <p:txBody>
+          <a:bodyPr vert="horz" wrap="square" lIns="146304" tIns="91440" rIns="146304" bIns="91440" rtlCol="0">
+            <a:normAutofit/>
+          </a:bodyPr>
+          <a:lstStyle>
+            <a:lvl1pPr marL="342900" marR="0" indent="-342900" algn="l" defTabSz="932742" rtl="0" eaLnBrk="1" fontAlgn="auto" latinLnBrk="0" hangingPunct="1">
+              <a:lnSpc>
+                <a:spcPct val="90000"/>
+              </a:lnSpc>
+              <a:spcBef>
+                <a:spcPct val="20000"/>
+              </a:spcBef>
+              <a:spcAft>
+                <a:spcPts val="0"/>
+              </a:spcAft>
+              <a:buClrTx/>
+              <a:buSzPct val="90000"/>
+              <a:buFont typeface="Arial" pitchFamily="34" charset="0"/>
+              <a:buChar char="•"/>
+              <a:tabLst/>
+              <a:defRPr sz="3600" kern="1200" spc="0" baseline="0">
+                <a:gradFill>
+                  <a:gsLst>
+                    <a:gs pos="1250">
+                      <a:schemeClr val="tx1"/>
+                    </a:gs>
+                    <a:gs pos="99000">
+                      <a:schemeClr val="tx1"/>
+                    </a:gs>
+                  </a:gsLst>
+                  <a:lin ang="5400000" scaled="0"/>
+                </a:gradFill>
+                <a:latin typeface="+mj-lt"/>
+                <a:ea typeface="+mn-ea"/>
+                <a:cs typeface="+mn-cs"/>
+              </a:defRPr>
+            </a:lvl1pPr>
+            <a:lvl2pPr marL="584200" marR="0" indent="-241300" algn="l" defTabSz="932742" rtl="0" eaLnBrk="1" fontAlgn="auto" latinLnBrk="0" hangingPunct="1">
+              <a:lnSpc>
+                <a:spcPct val="90000"/>
+              </a:lnSpc>
+              <a:spcBef>
+                <a:spcPct val="20000"/>
+              </a:spcBef>
+              <a:spcAft>
+                <a:spcPts val="0"/>
+              </a:spcAft>
+              <a:buClrTx/>
+              <a:buSzPct val="90000"/>
+              <a:buFont typeface="Arial" pitchFamily="34" charset="0"/>
+              <a:buChar char="•"/>
+              <a:tabLst/>
+              <a:defRPr sz="2400" kern="1200" spc="0" baseline="0">
+                <a:gradFill>
+                  <a:gsLst>
+                    <a:gs pos="1250">
+                      <a:schemeClr val="tx1"/>
+                    </a:gs>
+                    <a:gs pos="99000">
+                      <a:schemeClr val="tx1"/>
+                    </a:gs>
+                  </a:gsLst>
+                  <a:lin ang="5400000" scaled="0"/>
+                </a:gradFill>
+                <a:latin typeface="+mn-lt"/>
+                <a:ea typeface="+mn-ea"/>
+                <a:cs typeface="+mn-cs"/>
+              </a:defRPr>
+            </a:lvl2pPr>
+            <a:lvl3pPr marL="800100" marR="0" indent="-228600" algn="l" defTabSz="932742" rtl="0" eaLnBrk="1" fontAlgn="auto" latinLnBrk="0" hangingPunct="1">
+              <a:lnSpc>
+                <a:spcPct val="90000"/>
+              </a:lnSpc>
+              <a:spcBef>
+                <a:spcPct val="20000"/>
+              </a:spcBef>
+              <a:spcAft>
+                <a:spcPts val="0"/>
+              </a:spcAft>
+              <a:buClrTx/>
+              <a:buSzPct val="90000"/>
+              <a:buFont typeface="Arial" pitchFamily="34" charset="0"/>
+              <a:buChar char="•"/>
+              <a:tabLst/>
+              <a:defRPr sz="2000" kern="1200" spc="0" baseline="0">
+                <a:gradFill>
+                  <a:gsLst>
+                    <a:gs pos="1250">
+                      <a:schemeClr val="tx1"/>
+                    </a:gs>
+                    <a:gs pos="99000">
+                      <a:schemeClr val="tx1"/>
+                    </a:gs>
+                  </a:gsLst>
+                  <a:lin ang="5400000" scaled="0"/>
+                </a:gradFill>
+                <a:latin typeface="+mn-lt"/>
+                <a:ea typeface="+mn-ea"/>
+                <a:cs typeface="+mn-cs"/>
+              </a:defRPr>
+            </a:lvl3pPr>
+            <a:lvl4pPr marL="1028700" marR="0" indent="-228600" algn="l" defTabSz="932742" rtl="0" eaLnBrk="1" fontAlgn="auto" latinLnBrk="0" hangingPunct="1">
+              <a:lnSpc>
+                <a:spcPct val="90000"/>
+              </a:lnSpc>
+              <a:spcBef>
+                <a:spcPct val="20000"/>
+              </a:spcBef>
+              <a:spcAft>
+                <a:spcPts val="0"/>
+              </a:spcAft>
+              <a:buClrTx/>
+              <a:buSzPct val="90000"/>
+              <a:buFont typeface="Arial" pitchFamily="34" charset="0"/>
+              <a:buChar char="•"/>
+              <a:tabLst/>
+              <a:defRPr sz="1800" kern="1200" spc="0" baseline="0">
+                <a:gradFill>
+                  <a:gsLst>
+                    <a:gs pos="1250">
+                      <a:schemeClr val="tx1"/>
+                    </a:gs>
+                    <a:gs pos="99000">
+                      <a:schemeClr val="tx1"/>
+                    </a:gs>
+                  </a:gsLst>
+                  <a:lin ang="5400000" scaled="0"/>
+                </a:gradFill>
+                <a:latin typeface="+mn-lt"/>
+                <a:ea typeface="+mn-ea"/>
+                <a:cs typeface="+mn-cs"/>
+              </a:defRPr>
+            </a:lvl4pPr>
+            <a:lvl5pPr marL="1257300" marR="0" indent="-228600" algn="l" defTabSz="932742" rtl="0" eaLnBrk="1" fontAlgn="auto" latinLnBrk="0" hangingPunct="1">
+              <a:lnSpc>
+                <a:spcPct val="90000"/>
+              </a:lnSpc>
+              <a:spcBef>
+                <a:spcPct val="20000"/>
+              </a:spcBef>
+              <a:spcAft>
+                <a:spcPts val="0"/>
+              </a:spcAft>
+              <a:buClrTx/>
+              <a:buSzPct val="90000"/>
+              <a:buFont typeface="Arial" pitchFamily="34" charset="0"/>
+              <a:buChar char="•"/>
+              <a:tabLst/>
+              <a:defRPr sz="1800" kern="1200" spc="0" baseline="0">
+                <a:gradFill>
+                  <a:gsLst>
+                    <a:gs pos="1250">
+                      <a:schemeClr val="tx1"/>
+                    </a:gs>
+                    <a:gs pos="99000">
+                      <a:schemeClr val="tx1"/>
+                    </a:gs>
+                  </a:gsLst>
+                  <a:lin ang="5400000" scaled="0"/>
+                </a:gradFill>
+                <a:latin typeface="+mn-lt"/>
+                <a:ea typeface="+mn-ea"/>
+                <a:cs typeface="+mn-cs"/>
+              </a:defRPr>
+            </a:lvl5pPr>
+            <a:lvl6pPr marL="2565040" indent="-233186" algn="l" defTabSz="932742" rtl="0" eaLnBrk="1" latinLnBrk="0" hangingPunct="1">
+              <a:spcBef>
+                <a:spcPct val="20000"/>
+              </a:spcBef>
+              <a:buFont typeface="Arial" pitchFamily="34" charset="0"/>
+              <a:buChar char="•"/>
+              <a:defRPr sz="2000" kern="1200">
+                <a:solidFill>
+                  <a:schemeClr val="tx1"/>
+                </a:solidFill>
+                <a:latin typeface="+mn-lt"/>
+                <a:ea typeface="+mn-ea"/>
+                <a:cs typeface="+mn-cs"/>
+              </a:defRPr>
+            </a:lvl6pPr>
+            <a:lvl7pPr marL="3031412" indent="-233186" algn="l" defTabSz="932742" rtl="0" eaLnBrk="1" latinLnBrk="0" hangingPunct="1">
+              <a:spcBef>
+                <a:spcPct val="20000"/>
+              </a:spcBef>
+              <a:buFont typeface="Arial" pitchFamily="34" charset="0"/>
+              <a:buChar char="•"/>
+              <a:defRPr sz="2000" kern="1200">
+                <a:solidFill>
+                  <a:schemeClr val="tx1"/>
+                </a:solidFill>
+                <a:latin typeface="+mn-lt"/>
+                <a:ea typeface="+mn-ea"/>
+                <a:cs typeface="+mn-cs"/>
+              </a:defRPr>
+            </a:lvl7pPr>
+            <a:lvl8pPr marL="3497783" indent="-233186" algn="l" defTabSz="932742" rtl="0" eaLnBrk="1" latinLnBrk="0" hangingPunct="1">
+              <a:spcBef>
+                <a:spcPct val="20000"/>
+              </a:spcBef>
+              <a:buFont typeface="Arial" pitchFamily="34" charset="0"/>
+              <a:buChar char="•"/>
+              <a:defRPr sz="2000" kern="1200">
+                <a:solidFill>
+                  <a:schemeClr val="tx1"/>
+                </a:solidFill>
+                <a:latin typeface="+mn-lt"/>
+                <a:ea typeface="+mn-ea"/>
+                <a:cs typeface="+mn-cs"/>
+              </a:defRPr>
+            </a:lvl8pPr>
+            <a:lvl9pPr marL="3964155" indent="-233186" algn="l" defTabSz="932742" rtl="0" eaLnBrk="1" latinLnBrk="0" hangingPunct="1">
+              <a:spcBef>
+                <a:spcPct val="20000"/>
+              </a:spcBef>
+              <a:buFont typeface="Arial" pitchFamily="34" charset="0"/>
+              <a:buChar char="•"/>
+              <a:defRPr sz="2000" kern="1200">
+                <a:solidFill>
+                  <a:schemeClr val="tx1"/>
+                </a:solidFill>
+                <a:latin typeface="+mn-lt"/>
+                <a:ea typeface="+mn-ea"/>
+                <a:cs typeface="+mn-cs"/>
+              </a:defRPr>
+            </a:lvl9pPr>
+          </a:lstStyle>
+          <a:p>
+            <a:pPr marL="0" indent="0">
+              <a:buNone/>
+            </a:pPr>
+            <a:r>
+              <a:rPr lang="en-US" dirty="0"/>
+              <a:t>Define a family of algorithms, encapsulate each one, and make them interchangeable. Strategy lets the algorithm vary independently from clients that use it. </a:t>
+            </a:r>
+            <a:endParaRPr lang="en-US" dirty="0"/>
+          </a:p>
+        </p:txBody>
+      </p:sp>
+      <p:sp>
+        <p:nvSpPr>
+          <p:cNvPr id="3" name="Titel 1"/>
+          <p:cNvSpPr txBox="1">
+            <a:spLocks/>
+          </p:cNvSpPr>
+          <p:nvPr/>
+        </p:nvSpPr>
+        <p:spPr>
+          <a:xfrm>
+            <a:off x="273844" y="295275"/>
+            <a:ext cx="8778875" cy="917575"/>
+          </a:xfrm>
+          <a:prstGeom prst="rect">
+            <a:avLst/>
+          </a:prstGeom>
+        </p:spPr>
+        <p:txBody>
+          <a:bodyPr vert="horz" wrap="square" lIns="146304" tIns="91440" rIns="146304" bIns="91440" rtlCol="0" anchor="t">
+            <a:noAutofit/>
+          </a:bodyPr>
+          <a:lstStyle>
+            <a:lvl1pPr algn="l" defTabSz="932742" rtl="0" eaLnBrk="1" latinLnBrk="0" hangingPunct="1">
+              <a:lnSpc>
+                <a:spcPct val="90000"/>
+              </a:lnSpc>
+              <a:spcBef>
+                <a:spcPct val="0"/>
+              </a:spcBef>
+              <a:buNone/>
+              <a:defRPr lang="en-US" sz="4800" b="0" kern="1200" cap="none" spc="-102" baseline="0" dirty="0" smtClean="0">
+                <a:ln w="3175">
+                  <a:noFill/>
+                </a:ln>
+                <a:gradFill>
+                  <a:gsLst>
+                    <a:gs pos="1250">
+                      <a:schemeClr val="tx1"/>
+                    </a:gs>
+                    <a:gs pos="100000">
+                      <a:schemeClr val="tx1"/>
+                    </a:gs>
+                  </a:gsLst>
+                  <a:lin ang="5400000" scaled="0"/>
+                </a:gradFill>
+                <a:effectLst/>
+                <a:latin typeface="+mj-lt"/>
+                <a:ea typeface="+mn-ea"/>
+                <a:cs typeface="Segoe UI" pitchFamily="34" charset="0"/>
+              </a:defRPr>
+            </a:lvl1pPr>
+          </a:lstStyle>
+          <a:p>
+            <a:r>
+              <a:rPr lang="en-US" dirty="0"/>
+              <a:t>Strategy</a:t>
+            </a:r>
+          </a:p>
+        </p:txBody>
+      </p:sp>
+      <p:pic>
+        <p:nvPicPr>
+          <p:cNvPr id="4" name="Picture 3"/>
+          <p:cNvPicPr>
+            <a:picLocks noChangeAspect="1"/>
+          </p:cNvPicPr>
+          <p:nvPr/>
+        </p:nvPicPr>
+        <p:blipFill>
+          <a:blip r:embed="rId2"/>
+          <a:stretch>
+            <a:fillRect/>
+          </a:stretch>
+        </p:blipFill>
+        <p:spPr>
+          <a:xfrm>
+            <a:off x="156007" y="3497262"/>
+            <a:ext cx="9035455" cy="3390880"/>
+          </a:xfrm>
+          <a:prstGeom prst="rect">
+            <a:avLst/>
+          </a:prstGeom>
+        </p:spPr>
+      </p:pic>
+    </p:spTree>
+    <p:extLst>
+      <p:ext uri="{BB962C8B-B14F-4D97-AF65-F5344CB8AC3E}">
+        <p14:creationId xmlns:p14="http://schemas.microsoft.com/office/powerpoint/2010/main" val="155025199"/>
+      </p:ext>
+    </p:extLst>
+  </p:cSld>
+  <p:clrMapOvr>
+    <a:masterClrMapping/>
+  </p:clrMapOvr>
+  <p:transition>
+    <p:fade/>
+  </p:transition>
+</p:sld>
+</file>
+
+<file path=ppt/slides/slide11.xml><?xml version="1.0" encoding="utf-8"?>
+<p:sld xmlns:a="http://schemas.openxmlformats.org/drawingml/2006/main" xmlns:r="http://schemas.openxmlformats.org/officeDocument/2006/relationships" xmlns:p="http://schemas.openxmlformats.org/presentationml/2006/main">
+  <p:cSld>
+    <p:bg>
+      <p:bgPr>
+        <a:solidFill>
+          <a:srgbClr val="007233"/>
+        </a:solidFill>
+        <a:effectLst/>
+      </p:bgPr>
+    </p:bg>
+    <p:spTree>
+      <p:nvGrpSpPr>
+        <p:cNvPr id="1" name=""/>
+        <p:cNvGrpSpPr/>
+        <p:nvPr/>
+      </p:nvGrpSpPr>
+      <p:grpSpPr>
+        <a:xfrm>
+          <a:off x="0" y="0"/>
+          <a:ext cx="0" cy="0"/>
+          <a:chOff x="0" y="0"/>
+          <a:chExt cx="0" cy="0"/>
+        </a:xfrm>
+      </p:grpSpPr>
+      <p:sp>
+        <p:nvSpPr>
+          <p:cNvPr id="2" name="Pladsholder til indhold 2"/>
+          <p:cNvSpPr txBox="1">
+            <a:spLocks/>
+          </p:cNvSpPr>
+          <p:nvPr/>
+        </p:nvSpPr>
+        <p:spPr>
+          <a:xfrm>
+            <a:off x="273844" y="1212850"/>
+            <a:ext cx="8778875" cy="5393338"/>
+          </a:xfrm>
+          <a:prstGeom prst="rect">
+            <a:avLst/>
+          </a:prstGeom>
+        </p:spPr>
+        <p:txBody>
+          <a:bodyPr vert="horz" wrap="square" lIns="146304" tIns="91440" rIns="146304" bIns="91440" rtlCol="0">
+            <a:normAutofit/>
+          </a:bodyPr>
+          <a:lstStyle>
+            <a:lvl1pPr marL="342900" marR="0" indent="-342900" algn="l" defTabSz="932742" rtl="0" eaLnBrk="1" fontAlgn="auto" latinLnBrk="0" hangingPunct="1">
+              <a:lnSpc>
+                <a:spcPct val="90000"/>
+              </a:lnSpc>
+              <a:spcBef>
+                <a:spcPct val="20000"/>
+              </a:spcBef>
+              <a:spcAft>
+                <a:spcPts val="0"/>
+              </a:spcAft>
+              <a:buClrTx/>
+              <a:buSzPct val="90000"/>
+              <a:buFont typeface="Arial" pitchFamily="34" charset="0"/>
+              <a:buChar char="•"/>
+              <a:tabLst/>
+              <a:defRPr sz="3600" kern="1200" spc="0" baseline="0">
+                <a:gradFill>
+                  <a:gsLst>
+                    <a:gs pos="1250">
+                      <a:schemeClr val="tx1"/>
+                    </a:gs>
+                    <a:gs pos="99000">
+                      <a:schemeClr val="tx1"/>
+                    </a:gs>
+                  </a:gsLst>
+                  <a:lin ang="5400000" scaled="0"/>
+                </a:gradFill>
+                <a:latin typeface="+mj-lt"/>
+                <a:ea typeface="+mn-ea"/>
+                <a:cs typeface="+mn-cs"/>
+              </a:defRPr>
+            </a:lvl1pPr>
+            <a:lvl2pPr marL="584200" marR="0" indent="-241300" algn="l" defTabSz="932742" rtl="0" eaLnBrk="1" fontAlgn="auto" latinLnBrk="0" hangingPunct="1">
+              <a:lnSpc>
+                <a:spcPct val="90000"/>
+              </a:lnSpc>
+              <a:spcBef>
+                <a:spcPct val="20000"/>
+              </a:spcBef>
+              <a:spcAft>
+                <a:spcPts val="0"/>
+              </a:spcAft>
+              <a:buClrTx/>
+              <a:buSzPct val="90000"/>
+              <a:buFont typeface="Arial" pitchFamily="34" charset="0"/>
+              <a:buChar char="•"/>
+              <a:tabLst/>
+              <a:defRPr sz="2400" kern="1200" spc="0" baseline="0">
+                <a:gradFill>
+                  <a:gsLst>
+                    <a:gs pos="1250">
+                      <a:schemeClr val="tx1"/>
+                    </a:gs>
+                    <a:gs pos="99000">
+                      <a:schemeClr val="tx1"/>
+                    </a:gs>
+                  </a:gsLst>
+                  <a:lin ang="5400000" scaled="0"/>
+                </a:gradFill>
+                <a:latin typeface="+mn-lt"/>
+                <a:ea typeface="+mn-ea"/>
+                <a:cs typeface="+mn-cs"/>
+              </a:defRPr>
+            </a:lvl2pPr>
+            <a:lvl3pPr marL="800100" marR="0" indent="-228600" algn="l" defTabSz="932742" rtl="0" eaLnBrk="1" fontAlgn="auto" latinLnBrk="0" hangingPunct="1">
+              <a:lnSpc>
+                <a:spcPct val="90000"/>
+              </a:lnSpc>
+              <a:spcBef>
+                <a:spcPct val="20000"/>
+              </a:spcBef>
+              <a:spcAft>
+                <a:spcPts val="0"/>
+              </a:spcAft>
+              <a:buClrTx/>
+              <a:buSzPct val="90000"/>
+              <a:buFont typeface="Arial" pitchFamily="34" charset="0"/>
+              <a:buChar char="•"/>
+              <a:tabLst/>
+              <a:defRPr sz="2000" kern="1200" spc="0" baseline="0">
+                <a:gradFill>
+                  <a:gsLst>
+                    <a:gs pos="1250">
+                      <a:schemeClr val="tx1"/>
+                    </a:gs>
+                    <a:gs pos="99000">
+                      <a:schemeClr val="tx1"/>
+                    </a:gs>
+                  </a:gsLst>
+                  <a:lin ang="5400000" scaled="0"/>
+                </a:gradFill>
+                <a:latin typeface="+mn-lt"/>
+                <a:ea typeface="+mn-ea"/>
+                <a:cs typeface="+mn-cs"/>
+              </a:defRPr>
+            </a:lvl3pPr>
+            <a:lvl4pPr marL="1028700" marR="0" indent="-228600" algn="l" defTabSz="932742" rtl="0" eaLnBrk="1" fontAlgn="auto" latinLnBrk="0" hangingPunct="1">
+              <a:lnSpc>
+                <a:spcPct val="90000"/>
+              </a:lnSpc>
+              <a:spcBef>
+                <a:spcPct val="20000"/>
+              </a:spcBef>
+              <a:spcAft>
+                <a:spcPts val="0"/>
+              </a:spcAft>
+              <a:buClrTx/>
+              <a:buSzPct val="90000"/>
+              <a:buFont typeface="Arial" pitchFamily="34" charset="0"/>
+              <a:buChar char="•"/>
+              <a:tabLst/>
+              <a:defRPr sz="1800" kern="1200" spc="0" baseline="0">
+                <a:gradFill>
+                  <a:gsLst>
+                    <a:gs pos="1250">
+                      <a:schemeClr val="tx1"/>
+                    </a:gs>
+                    <a:gs pos="99000">
+                      <a:schemeClr val="tx1"/>
+                    </a:gs>
+                  </a:gsLst>
+                  <a:lin ang="5400000" scaled="0"/>
+                </a:gradFill>
+                <a:latin typeface="+mn-lt"/>
+                <a:ea typeface="+mn-ea"/>
+                <a:cs typeface="+mn-cs"/>
+              </a:defRPr>
+            </a:lvl4pPr>
+            <a:lvl5pPr marL="1257300" marR="0" indent="-228600" algn="l" defTabSz="932742" rtl="0" eaLnBrk="1" fontAlgn="auto" latinLnBrk="0" hangingPunct="1">
+              <a:lnSpc>
+                <a:spcPct val="90000"/>
+              </a:lnSpc>
+              <a:spcBef>
+                <a:spcPct val="20000"/>
+              </a:spcBef>
+              <a:spcAft>
+                <a:spcPts val="0"/>
+              </a:spcAft>
+              <a:buClrTx/>
+              <a:buSzPct val="90000"/>
+              <a:buFont typeface="Arial" pitchFamily="34" charset="0"/>
+              <a:buChar char="•"/>
+              <a:tabLst/>
+              <a:defRPr sz="1800" kern="1200" spc="0" baseline="0">
+                <a:gradFill>
+                  <a:gsLst>
+                    <a:gs pos="1250">
+                      <a:schemeClr val="tx1"/>
+                    </a:gs>
+                    <a:gs pos="99000">
+                      <a:schemeClr val="tx1"/>
+                    </a:gs>
+                  </a:gsLst>
+                  <a:lin ang="5400000" scaled="0"/>
+                </a:gradFill>
+                <a:latin typeface="+mn-lt"/>
+                <a:ea typeface="+mn-ea"/>
+                <a:cs typeface="+mn-cs"/>
+              </a:defRPr>
+            </a:lvl5pPr>
+            <a:lvl6pPr marL="2565040" indent="-233186" algn="l" defTabSz="932742" rtl="0" eaLnBrk="1" latinLnBrk="0" hangingPunct="1">
+              <a:spcBef>
+                <a:spcPct val="20000"/>
+              </a:spcBef>
+              <a:buFont typeface="Arial" pitchFamily="34" charset="0"/>
+              <a:buChar char="•"/>
+              <a:defRPr sz="2000" kern="1200">
+                <a:solidFill>
+                  <a:schemeClr val="tx1"/>
+                </a:solidFill>
+                <a:latin typeface="+mn-lt"/>
+                <a:ea typeface="+mn-ea"/>
+                <a:cs typeface="+mn-cs"/>
+              </a:defRPr>
+            </a:lvl6pPr>
+            <a:lvl7pPr marL="3031412" indent="-233186" algn="l" defTabSz="932742" rtl="0" eaLnBrk="1" latinLnBrk="0" hangingPunct="1">
+              <a:spcBef>
+                <a:spcPct val="20000"/>
+              </a:spcBef>
+              <a:buFont typeface="Arial" pitchFamily="34" charset="0"/>
+              <a:buChar char="•"/>
+              <a:defRPr sz="2000" kern="1200">
+                <a:solidFill>
+                  <a:schemeClr val="tx1"/>
+                </a:solidFill>
+                <a:latin typeface="+mn-lt"/>
+                <a:ea typeface="+mn-ea"/>
+                <a:cs typeface="+mn-cs"/>
+              </a:defRPr>
+            </a:lvl7pPr>
+            <a:lvl8pPr marL="3497783" indent="-233186" algn="l" defTabSz="932742" rtl="0" eaLnBrk="1" latinLnBrk="0" hangingPunct="1">
+              <a:spcBef>
+                <a:spcPct val="20000"/>
+              </a:spcBef>
+              <a:buFont typeface="Arial" pitchFamily="34" charset="0"/>
+              <a:buChar char="•"/>
+              <a:defRPr sz="2000" kern="1200">
+                <a:solidFill>
+                  <a:schemeClr val="tx1"/>
+                </a:solidFill>
+                <a:latin typeface="+mn-lt"/>
+                <a:ea typeface="+mn-ea"/>
+                <a:cs typeface="+mn-cs"/>
+              </a:defRPr>
+            </a:lvl8pPr>
+            <a:lvl9pPr marL="3964155" indent="-233186" algn="l" defTabSz="932742" rtl="0" eaLnBrk="1" latinLnBrk="0" hangingPunct="1">
+              <a:spcBef>
+                <a:spcPct val="20000"/>
+              </a:spcBef>
+              <a:buFont typeface="Arial" pitchFamily="34" charset="0"/>
+              <a:buChar char="•"/>
+              <a:defRPr sz="2000" kern="1200">
+                <a:solidFill>
+                  <a:schemeClr val="tx1"/>
+                </a:solidFill>
+                <a:latin typeface="+mn-lt"/>
+                <a:ea typeface="+mn-ea"/>
+                <a:cs typeface="+mn-cs"/>
+              </a:defRPr>
+            </a:lvl9pPr>
+          </a:lstStyle>
+          <a:p>
+            <a:pPr marL="0" indent="0">
+              <a:buNone/>
+            </a:pPr>
+            <a:r>
+              <a:rPr lang="en-US" dirty="0"/>
+              <a:t>Decouple an abstraction from its implementation so that the two can vary independently. </a:t>
+            </a:r>
+            <a:endParaRPr lang="en-US" dirty="0"/>
+          </a:p>
+        </p:txBody>
+      </p:sp>
+      <p:sp>
+        <p:nvSpPr>
+          <p:cNvPr id="3" name="Titel 1"/>
+          <p:cNvSpPr txBox="1">
+            <a:spLocks/>
+          </p:cNvSpPr>
+          <p:nvPr/>
+        </p:nvSpPr>
+        <p:spPr>
+          <a:xfrm>
+            <a:off x="273844" y="295275"/>
+            <a:ext cx="8778875" cy="917575"/>
+          </a:xfrm>
+          <a:prstGeom prst="rect">
+            <a:avLst/>
+          </a:prstGeom>
+        </p:spPr>
+        <p:txBody>
+          <a:bodyPr vert="horz" wrap="square" lIns="146304" tIns="91440" rIns="146304" bIns="91440" rtlCol="0" anchor="t">
+            <a:noAutofit/>
+          </a:bodyPr>
+          <a:lstStyle>
+            <a:lvl1pPr algn="l" defTabSz="932742" rtl="0" eaLnBrk="1" latinLnBrk="0" hangingPunct="1">
+              <a:lnSpc>
+                <a:spcPct val="90000"/>
+              </a:lnSpc>
+              <a:spcBef>
+                <a:spcPct val="0"/>
+              </a:spcBef>
+              <a:buNone/>
+              <a:defRPr lang="en-US" sz="4800" b="0" kern="1200" cap="none" spc="-102" baseline="0" dirty="0" smtClean="0">
+                <a:ln w="3175">
+                  <a:noFill/>
+                </a:ln>
+                <a:gradFill>
+                  <a:gsLst>
+                    <a:gs pos="1250">
+                      <a:schemeClr val="tx1"/>
+                    </a:gs>
+                    <a:gs pos="100000">
+                      <a:schemeClr val="tx1"/>
+                    </a:gs>
+                  </a:gsLst>
+                  <a:lin ang="5400000" scaled="0"/>
+                </a:gradFill>
+                <a:effectLst/>
+                <a:latin typeface="+mj-lt"/>
+                <a:ea typeface="+mn-ea"/>
+                <a:cs typeface="Segoe UI" pitchFamily="34" charset="0"/>
+              </a:defRPr>
+            </a:lvl1pPr>
+          </a:lstStyle>
+          <a:p>
+            <a:r>
+              <a:rPr lang="en-US" dirty="0"/>
+              <a:t>Bridge</a:t>
+            </a:r>
+          </a:p>
+        </p:txBody>
+      </p:sp>
+      <p:pic>
+        <p:nvPicPr>
+          <p:cNvPr id="4" name="Picture 3"/>
+          <p:cNvPicPr>
+            <a:picLocks noChangeAspect="1"/>
+          </p:cNvPicPr>
+          <p:nvPr/>
+        </p:nvPicPr>
+        <p:blipFill>
+          <a:blip r:embed="rId2"/>
+          <a:stretch>
+            <a:fillRect/>
+          </a:stretch>
+        </p:blipFill>
+        <p:spPr>
+          <a:xfrm>
+            <a:off x="3108818" y="2941281"/>
+            <a:ext cx="6095980" cy="3986880"/>
+          </a:xfrm>
+          <a:prstGeom prst="rect">
+            <a:avLst/>
+          </a:prstGeom>
+        </p:spPr>
+      </p:pic>
+    </p:spTree>
+    <p:extLst>
+      <p:ext uri="{BB962C8B-B14F-4D97-AF65-F5344CB8AC3E}">
+        <p14:creationId xmlns:p14="http://schemas.microsoft.com/office/powerpoint/2010/main" val="3097423743"/>
+      </p:ext>
+    </p:extLst>
+  </p:cSld>
+  <p:clrMapOvr>
+    <a:masterClrMapping/>
+  </p:clrMapOvr>
+  <p:transition>
+    <p:fade/>
+  </p:transition>
+</p:sld>
+</file>
+
 <file path=ppt/slides/slide2.xml><?xml version="1.0" encoding="utf-8"?>
 <p:sld xmlns:a="http://schemas.openxmlformats.org/drawingml/2006/main" xmlns:r="http://schemas.openxmlformats.org/officeDocument/2006/relationships" xmlns:p="http://schemas.openxmlformats.org/presentationml/2006/main">
   <p:cSld>
@@ -4678,7 +5436,7 @@
         <p:spPr>
           <a:xfrm>
             <a:off x="273049" y="1211287"/>
-            <a:ext cx="4206240" cy="7195816"/>
+            <a:ext cx="4206240" cy="6598730"/>
           </a:xfrm>
         </p:spPr>
         <p:txBody>
@@ -4767,7 +5525,20 @@
                   <a:schemeClr val="bg1"/>
                 </a:solidFill>
               </a:rPr>
-              <a:t>Composite</a:t>
+              <a:t>Chain of Responsibility</a:t>
+            </a:r>
+          </a:p>
+          <a:p>
+            <a:pPr marL="0" indent="0">
+              <a:buNone/>
+            </a:pPr>
+            <a:r>
+              <a:rPr lang="en-US" dirty="0">
+                <a:solidFill>
+                  <a:schemeClr val="bg1"/>
+                </a:solidFill>
+              </a:rPr>
+              <a:t>Strategy</a:t>
             </a:r>
           </a:p>
           <a:p>
@@ -4782,45 +5553,21 @@
               </a:rPr>
               <a:t>Bridge</a:t>
             </a:r>
+            <a:endParaRPr lang="en-US" dirty="0">
+              <a:solidFill>
+                <a:schemeClr val="bg1"/>
+              </a:solidFill>
+            </a:endParaRPr>
           </a:p>
           <a:p>
             <a:pPr marL="0" indent="0">
               <a:buNone/>
             </a:pPr>
-            <a:r>
-              <a:rPr lang="en-US" dirty="0">
-                <a:solidFill>
-                  <a:schemeClr val="bg1"/>
-                </a:solidFill>
-              </a:rPr>
-              <a:t>Proxy</a:t>
-            </a:r>
-          </a:p>
-          <a:p>
-            <a:pPr marL="0" indent="0">
-              <a:buNone/>
-            </a:pPr>
-            <a:r>
-              <a:rPr lang="en-US" dirty="0">
-                <a:solidFill>
-                  <a:schemeClr val="bg1"/>
-                </a:solidFill>
-              </a:rPr>
-              <a:t>Chain of Responsibility</a:t>
-            </a:r>
-          </a:p>
-          <a:p>
-            <a:pPr marL="0" indent="0">
-              <a:buNone/>
-            </a:pPr>
-            <a:r>
-              <a:rPr lang="en-US" dirty="0">
-                <a:solidFill>
-                  <a:schemeClr val="bg1"/>
-                </a:solidFill>
-              </a:rPr>
-              <a:t>Strategy</a:t>
-            </a:r>
+            <a:endParaRPr lang="en-US" dirty="0">
+              <a:solidFill>
+                <a:schemeClr val="bg1"/>
+              </a:solidFill>
+            </a:endParaRPr>
           </a:p>
           <a:p>
             <a:pPr marL="0" indent="0">
@@ -4857,7 +5604,7 @@
         <p:spPr>
           <a:xfrm>
             <a:off x="4846158" y="1211287"/>
-            <a:ext cx="4206240" cy="4210383"/>
+            <a:ext cx="4206240" cy="5404556"/>
           </a:xfrm>
         </p:spPr>
         <p:txBody>
@@ -4870,7 +5617,7 @@
             <a:r>
               <a:rPr lang="da-DK" dirty="0" err="1">
                 <a:solidFill>
-                  <a:schemeClr val="bg1"/>
+                  <a:srgbClr val="000000"/>
                 </a:solidFill>
               </a:rPr>
               <a:t>Saved</a:t>
@@ -4878,7 +5625,7 @@
             <a:r>
               <a:rPr lang="da-DK" dirty="0">
                 <a:solidFill>
-                  <a:schemeClr val="bg1"/>
+                  <a:srgbClr val="000000"/>
                 </a:solidFill>
               </a:rPr>
               <a:t> for </a:t>
@@ -4886,7 +5633,7 @@
             <a:r>
               <a:rPr lang="da-DK" dirty="0" err="1">
                 <a:solidFill>
-                  <a:schemeClr val="bg1"/>
+                  <a:srgbClr val="000000"/>
                 </a:solidFill>
               </a:rPr>
               <a:t>later</a:t>
@@ -4894,7 +5641,7 @@
             <a:r>
               <a:rPr lang="da-DK" dirty="0">
                 <a:solidFill>
-                  <a:schemeClr val="bg1"/>
+                  <a:srgbClr val="000000"/>
                 </a:solidFill>
               </a:rPr>
               <a:t>:</a:t>
@@ -4924,6 +5671,19 @@
                 </a:solidFill>
               </a:rPr>
               <a:t>Observer (MVVM)</a:t>
+            </a:r>
+          </a:p>
+          <a:p>
+            <a:pPr marL="0" indent="0">
+              <a:buNone/>
+            </a:pPr>
+            <a:r>
+              <a:rPr lang="da-DK" dirty="0">
+                <a:solidFill>
+                  <a:schemeClr val="bg1"/>
+                </a:solidFill>
+              </a:rPr>
+              <a:t>Proxy (Web API)</a:t>
             </a:r>
           </a:p>
           <a:p>
@@ -4943,7 +5703,7 @@
             <a:r>
               <a:rPr lang="da-DK" dirty="0" err="1">
                 <a:solidFill>
-                  <a:schemeClr val="bg1"/>
+                  <a:srgbClr val="000000"/>
                 </a:solidFill>
               </a:rPr>
               <a:t>Probably</a:t>
@@ -4951,7 +5711,7 @@
             <a:r>
               <a:rPr lang="da-DK" dirty="0">
                 <a:solidFill>
-                  <a:schemeClr val="bg1"/>
+                  <a:srgbClr val="000000"/>
                 </a:solidFill>
               </a:rPr>
               <a:t> not </a:t>
@@ -4959,7 +5719,7 @@
             <a:r>
               <a:rPr lang="da-DK" dirty="0" err="1">
                 <a:solidFill>
-                  <a:schemeClr val="bg1"/>
+                  <a:srgbClr val="000000"/>
                 </a:solidFill>
               </a:rPr>
               <a:t>covered</a:t>
@@ -4967,7 +5727,7 @@
             <a:r>
               <a:rPr lang="da-DK" dirty="0">
                 <a:solidFill>
-                  <a:schemeClr val="bg1"/>
+                  <a:srgbClr val="000000"/>
                 </a:solidFill>
               </a:rPr>
               <a:t>:</a:t>
@@ -5002,6 +5762,19 @@
                 </a:solidFill>
               </a:rPr>
               <a:t>Visitor</a:t>
+            </a:r>
+          </a:p>
+          <a:p>
+            <a:pPr marL="0" indent="0">
+              <a:buNone/>
+            </a:pPr>
+            <a:r>
+              <a:rPr lang="en-US" dirty="0">
+                <a:solidFill>
+                  <a:schemeClr val="bg1"/>
+                </a:solidFill>
+              </a:rPr>
+              <a:t>Composite</a:t>
             </a:r>
             <a:endParaRPr lang="da-DK" dirty="0">
               <a:solidFill>
@@ -5484,6 +6257,785 @@
 <file path=ppt/slides/slide4.xml><?xml version="1.0" encoding="utf-8"?>
 <p:sld xmlns:a="http://schemas.openxmlformats.org/drawingml/2006/main" xmlns:r="http://schemas.openxmlformats.org/officeDocument/2006/relationships" xmlns:p="http://schemas.openxmlformats.org/presentationml/2006/main">
   <p:cSld>
+    <p:spTree>
+      <p:nvGrpSpPr>
+        <p:cNvPr id="1" name=""/>
+        <p:cNvGrpSpPr/>
+        <p:nvPr/>
+      </p:nvGrpSpPr>
+      <p:grpSpPr>
+        <a:xfrm>
+          <a:off x="0" y="0"/>
+          <a:ext cx="0" cy="0"/>
+          <a:chOff x="0" y="0"/>
+          <a:chExt cx="0" cy="0"/>
+        </a:xfrm>
+      </p:grpSpPr>
+      <p:sp>
+        <p:nvSpPr>
+          <p:cNvPr id="4" name="Pladsholder til indhold 2"/>
+          <p:cNvSpPr txBox="1">
+            <a:spLocks/>
+          </p:cNvSpPr>
+          <p:nvPr/>
+        </p:nvSpPr>
+        <p:spPr>
+          <a:xfrm>
+            <a:off x="273844" y="1212850"/>
+            <a:ext cx="8778875" cy="5393338"/>
+          </a:xfrm>
+          <a:prstGeom prst="rect">
+            <a:avLst/>
+          </a:prstGeom>
+        </p:spPr>
+        <p:txBody>
+          <a:bodyPr vert="horz" wrap="square" lIns="146304" tIns="91440" rIns="146304" bIns="91440" rtlCol="0">
+            <a:normAutofit/>
+          </a:bodyPr>
+          <a:lstStyle>
+            <a:lvl1pPr marL="342900" marR="0" indent="-342900" algn="l" defTabSz="932742" rtl="0" eaLnBrk="1" fontAlgn="auto" latinLnBrk="0" hangingPunct="1">
+              <a:lnSpc>
+                <a:spcPct val="90000"/>
+              </a:lnSpc>
+              <a:spcBef>
+                <a:spcPct val="20000"/>
+              </a:spcBef>
+              <a:spcAft>
+                <a:spcPts val="0"/>
+              </a:spcAft>
+              <a:buClrTx/>
+              <a:buSzPct val="90000"/>
+              <a:buFont typeface="Arial" pitchFamily="34" charset="0"/>
+              <a:buChar char="•"/>
+              <a:tabLst/>
+              <a:defRPr sz="3600" kern="1200" spc="0" baseline="0">
+                <a:gradFill>
+                  <a:gsLst>
+                    <a:gs pos="1250">
+                      <a:schemeClr val="tx1"/>
+                    </a:gs>
+                    <a:gs pos="99000">
+                      <a:schemeClr val="tx1"/>
+                    </a:gs>
+                  </a:gsLst>
+                  <a:lin ang="5400000" scaled="0"/>
+                </a:gradFill>
+                <a:latin typeface="+mj-lt"/>
+                <a:ea typeface="+mn-ea"/>
+                <a:cs typeface="+mn-cs"/>
+              </a:defRPr>
+            </a:lvl1pPr>
+            <a:lvl2pPr marL="584200" marR="0" indent="-241300" algn="l" defTabSz="932742" rtl="0" eaLnBrk="1" fontAlgn="auto" latinLnBrk="0" hangingPunct="1">
+              <a:lnSpc>
+                <a:spcPct val="90000"/>
+              </a:lnSpc>
+              <a:spcBef>
+                <a:spcPct val="20000"/>
+              </a:spcBef>
+              <a:spcAft>
+                <a:spcPts val="0"/>
+              </a:spcAft>
+              <a:buClrTx/>
+              <a:buSzPct val="90000"/>
+              <a:buFont typeface="Arial" pitchFamily="34" charset="0"/>
+              <a:buChar char="•"/>
+              <a:tabLst/>
+              <a:defRPr sz="2400" kern="1200" spc="0" baseline="0">
+                <a:gradFill>
+                  <a:gsLst>
+                    <a:gs pos="1250">
+                      <a:schemeClr val="tx1"/>
+                    </a:gs>
+                    <a:gs pos="99000">
+                      <a:schemeClr val="tx1"/>
+                    </a:gs>
+                  </a:gsLst>
+                  <a:lin ang="5400000" scaled="0"/>
+                </a:gradFill>
+                <a:latin typeface="+mn-lt"/>
+                <a:ea typeface="+mn-ea"/>
+                <a:cs typeface="+mn-cs"/>
+              </a:defRPr>
+            </a:lvl2pPr>
+            <a:lvl3pPr marL="800100" marR="0" indent="-228600" algn="l" defTabSz="932742" rtl="0" eaLnBrk="1" fontAlgn="auto" latinLnBrk="0" hangingPunct="1">
+              <a:lnSpc>
+                <a:spcPct val="90000"/>
+              </a:lnSpc>
+              <a:spcBef>
+                <a:spcPct val="20000"/>
+              </a:spcBef>
+              <a:spcAft>
+                <a:spcPts val="0"/>
+              </a:spcAft>
+              <a:buClrTx/>
+              <a:buSzPct val="90000"/>
+              <a:buFont typeface="Arial" pitchFamily="34" charset="0"/>
+              <a:buChar char="•"/>
+              <a:tabLst/>
+              <a:defRPr sz="2000" kern="1200" spc="0" baseline="0">
+                <a:gradFill>
+                  <a:gsLst>
+                    <a:gs pos="1250">
+                      <a:schemeClr val="tx1"/>
+                    </a:gs>
+                    <a:gs pos="99000">
+                      <a:schemeClr val="tx1"/>
+                    </a:gs>
+                  </a:gsLst>
+                  <a:lin ang="5400000" scaled="0"/>
+                </a:gradFill>
+                <a:latin typeface="+mn-lt"/>
+                <a:ea typeface="+mn-ea"/>
+                <a:cs typeface="+mn-cs"/>
+              </a:defRPr>
+            </a:lvl3pPr>
+            <a:lvl4pPr marL="1028700" marR="0" indent="-228600" algn="l" defTabSz="932742" rtl="0" eaLnBrk="1" fontAlgn="auto" latinLnBrk="0" hangingPunct="1">
+              <a:lnSpc>
+                <a:spcPct val="90000"/>
+              </a:lnSpc>
+              <a:spcBef>
+                <a:spcPct val="20000"/>
+              </a:spcBef>
+              <a:spcAft>
+                <a:spcPts val="0"/>
+              </a:spcAft>
+              <a:buClrTx/>
+              <a:buSzPct val="90000"/>
+              <a:buFont typeface="Arial" pitchFamily="34" charset="0"/>
+              <a:buChar char="•"/>
+              <a:tabLst/>
+              <a:defRPr sz="1800" kern="1200" spc="0" baseline="0">
+                <a:gradFill>
+                  <a:gsLst>
+                    <a:gs pos="1250">
+                      <a:schemeClr val="tx1"/>
+                    </a:gs>
+                    <a:gs pos="99000">
+                      <a:schemeClr val="tx1"/>
+                    </a:gs>
+                  </a:gsLst>
+                  <a:lin ang="5400000" scaled="0"/>
+                </a:gradFill>
+                <a:latin typeface="+mn-lt"/>
+                <a:ea typeface="+mn-ea"/>
+                <a:cs typeface="+mn-cs"/>
+              </a:defRPr>
+            </a:lvl4pPr>
+            <a:lvl5pPr marL="1257300" marR="0" indent="-228600" algn="l" defTabSz="932742" rtl="0" eaLnBrk="1" fontAlgn="auto" latinLnBrk="0" hangingPunct="1">
+              <a:lnSpc>
+                <a:spcPct val="90000"/>
+              </a:lnSpc>
+              <a:spcBef>
+                <a:spcPct val="20000"/>
+              </a:spcBef>
+              <a:spcAft>
+                <a:spcPts val="0"/>
+              </a:spcAft>
+              <a:buClrTx/>
+              <a:buSzPct val="90000"/>
+              <a:buFont typeface="Arial" pitchFamily="34" charset="0"/>
+              <a:buChar char="•"/>
+              <a:tabLst/>
+              <a:defRPr sz="1800" kern="1200" spc="0" baseline="0">
+                <a:gradFill>
+                  <a:gsLst>
+                    <a:gs pos="1250">
+                      <a:schemeClr val="tx1"/>
+                    </a:gs>
+                    <a:gs pos="99000">
+                      <a:schemeClr val="tx1"/>
+                    </a:gs>
+                  </a:gsLst>
+                  <a:lin ang="5400000" scaled="0"/>
+                </a:gradFill>
+                <a:latin typeface="+mn-lt"/>
+                <a:ea typeface="+mn-ea"/>
+                <a:cs typeface="+mn-cs"/>
+              </a:defRPr>
+            </a:lvl5pPr>
+            <a:lvl6pPr marL="2565040" indent="-233186" algn="l" defTabSz="932742" rtl="0" eaLnBrk="1" latinLnBrk="0" hangingPunct="1">
+              <a:spcBef>
+                <a:spcPct val="20000"/>
+              </a:spcBef>
+              <a:buFont typeface="Arial" pitchFamily="34" charset="0"/>
+              <a:buChar char="•"/>
+              <a:defRPr sz="2000" kern="1200">
+                <a:solidFill>
+                  <a:schemeClr val="tx1"/>
+                </a:solidFill>
+                <a:latin typeface="+mn-lt"/>
+                <a:ea typeface="+mn-ea"/>
+                <a:cs typeface="+mn-cs"/>
+              </a:defRPr>
+            </a:lvl6pPr>
+            <a:lvl7pPr marL="3031412" indent="-233186" algn="l" defTabSz="932742" rtl="0" eaLnBrk="1" latinLnBrk="0" hangingPunct="1">
+              <a:spcBef>
+                <a:spcPct val="20000"/>
+              </a:spcBef>
+              <a:buFont typeface="Arial" pitchFamily="34" charset="0"/>
+              <a:buChar char="•"/>
+              <a:defRPr sz="2000" kern="1200">
+                <a:solidFill>
+                  <a:schemeClr val="tx1"/>
+                </a:solidFill>
+                <a:latin typeface="+mn-lt"/>
+                <a:ea typeface="+mn-ea"/>
+                <a:cs typeface="+mn-cs"/>
+              </a:defRPr>
+            </a:lvl7pPr>
+            <a:lvl8pPr marL="3497783" indent="-233186" algn="l" defTabSz="932742" rtl="0" eaLnBrk="1" latinLnBrk="0" hangingPunct="1">
+              <a:spcBef>
+                <a:spcPct val="20000"/>
+              </a:spcBef>
+              <a:buFont typeface="Arial" pitchFamily="34" charset="0"/>
+              <a:buChar char="•"/>
+              <a:defRPr sz="2000" kern="1200">
+                <a:solidFill>
+                  <a:schemeClr val="tx1"/>
+                </a:solidFill>
+                <a:latin typeface="+mn-lt"/>
+                <a:ea typeface="+mn-ea"/>
+                <a:cs typeface="+mn-cs"/>
+              </a:defRPr>
+            </a:lvl8pPr>
+            <a:lvl9pPr marL="3964155" indent="-233186" algn="l" defTabSz="932742" rtl="0" eaLnBrk="1" latinLnBrk="0" hangingPunct="1">
+              <a:spcBef>
+                <a:spcPct val="20000"/>
+              </a:spcBef>
+              <a:buFont typeface="Arial" pitchFamily="34" charset="0"/>
+              <a:buChar char="•"/>
+              <a:defRPr sz="2000" kern="1200">
+                <a:solidFill>
+                  <a:schemeClr val="tx1"/>
+                </a:solidFill>
+                <a:latin typeface="+mn-lt"/>
+                <a:ea typeface="+mn-ea"/>
+                <a:cs typeface="+mn-cs"/>
+              </a:defRPr>
+            </a:lvl9pPr>
+          </a:lstStyle>
+          <a:p>
+            <a:pPr marL="0" indent="0">
+              <a:buNone/>
+            </a:pPr>
+            <a:r>
+              <a:rPr lang="en-US" dirty="0"/>
+              <a:t>Lifetime:</a:t>
+            </a:r>
+          </a:p>
+          <a:p>
+            <a:pPr marL="0" indent="0">
+              <a:buNone/>
+            </a:pPr>
+            <a:endParaRPr lang="en-US" dirty="0"/>
+          </a:p>
+          <a:p>
+            <a:pPr>
+              <a:buFontTx/>
+              <a:buChar char="-"/>
+            </a:pPr>
+            <a:r>
+              <a:rPr lang="en-US" dirty="0"/>
+              <a:t>Transient (every time)</a:t>
+            </a:r>
+          </a:p>
+          <a:p>
+            <a:pPr>
+              <a:buFontTx/>
+              <a:buChar char="-"/>
+            </a:pPr>
+            <a:r>
+              <a:rPr lang="en-US" dirty="0"/>
+              <a:t>Scoped (once per request)</a:t>
+            </a:r>
+          </a:p>
+          <a:p>
+            <a:pPr>
+              <a:buFontTx/>
+              <a:buChar char="-"/>
+            </a:pPr>
+            <a:r>
+              <a:rPr lang="en-US" dirty="0"/>
+              <a:t>Singleton (once)</a:t>
+            </a:r>
+          </a:p>
+          <a:p>
+            <a:pPr marL="0" indent="0">
+              <a:buNone/>
+            </a:pPr>
+            <a:endParaRPr lang="en-US" dirty="0"/>
+          </a:p>
+          <a:p>
+            <a:pPr marL="0" indent="0">
+              <a:buNone/>
+            </a:pPr>
+            <a:endParaRPr lang="da-DK" dirty="0"/>
+          </a:p>
+        </p:txBody>
+      </p:sp>
+      <p:sp>
+        <p:nvSpPr>
+          <p:cNvPr id="2" name="Titel 1"/>
+          <p:cNvSpPr txBox="1">
+            <a:spLocks/>
+          </p:cNvSpPr>
+          <p:nvPr/>
+        </p:nvSpPr>
+        <p:spPr>
+          <a:xfrm>
+            <a:off x="273844" y="295275"/>
+            <a:ext cx="8778875" cy="917575"/>
+          </a:xfrm>
+          <a:prstGeom prst="rect">
+            <a:avLst/>
+          </a:prstGeom>
+        </p:spPr>
+        <p:txBody>
+          <a:bodyPr vert="horz" wrap="square" lIns="146304" tIns="91440" rIns="146304" bIns="91440" rtlCol="0" anchor="t">
+            <a:noAutofit/>
+          </a:bodyPr>
+          <a:lstStyle>
+            <a:lvl1pPr algn="l" defTabSz="932742" rtl="0" eaLnBrk="1" latinLnBrk="0" hangingPunct="1">
+              <a:lnSpc>
+                <a:spcPct val="90000"/>
+              </a:lnSpc>
+              <a:spcBef>
+                <a:spcPct val="0"/>
+              </a:spcBef>
+              <a:buNone/>
+              <a:defRPr lang="en-US" sz="4800" b="0" kern="1200" cap="none" spc="-102" baseline="0" dirty="0" smtClean="0">
+                <a:ln w="3175">
+                  <a:noFill/>
+                </a:ln>
+                <a:gradFill>
+                  <a:gsLst>
+                    <a:gs pos="1250">
+                      <a:schemeClr val="tx1"/>
+                    </a:gs>
+                    <a:gs pos="100000">
+                      <a:schemeClr val="tx1"/>
+                    </a:gs>
+                  </a:gsLst>
+                  <a:lin ang="5400000" scaled="0"/>
+                </a:gradFill>
+                <a:effectLst/>
+                <a:latin typeface="+mj-lt"/>
+                <a:ea typeface="+mn-ea"/>
+                <a:cs typeface="Segoe UI" pitchFamily="34" charset="0"/>
+              </a:defRPr>
+            </a:lvl1pPr>
+          </a:lstStyle>
+          <a:p>
+            <a:r>
+              <a:rPr lang="da-DK" dirty="0" err="1"/>
+              <a:t>IoC</a:t>
+            </a:r>
+            <a:r>
+              <a:rPr lang="da-DK" dirty="0"/>
+              <a:t> Container II</a:t>
+            </a:r>
+          </a:p>
+        </p:txBody>
+      </p:sp>
+      <p:sp>
+        <p:nvSpPr>
+          <p:cNvPr id="3" name="Pladsholder til indhold 2"/>
+          <p:cNvSpPr txBox="1">
+            <a:spLocks/>
+          </p:cNvSpPr>
+          <p:nvPr/>
+        </p:nvSpPr>
+        <p:spPr>
+          <a:xfrm>
+            <a:off x="273844" y="1212850"/>
+            <a:ext cx="8778875" cy="5393338"/>
+          </a:xfrm>
+          <a:prstGeom prst="rect">
+            <a:avLst/>
+          </a:prstGeom>
+        </p:spPr>
+        <p:txBody>
+          <a:bodyPr vert="horz" wrap="square" lIns="146304" tIns="91440" rIns="146304" bIns="91440" rtlCol="0">
+            <a:normAutofit/>
+          </a:bodyPr>
+          <a:lstStyle>
+            <a:lvl1pPr marL="342900" marR="0" indent="-342900" algn="l" defTabSz="932742" rtl="0" eaLnBrk="1" fontAlgn="auto" latinLnBrk="0" hangingPunct="1">
+              <a:lnSpc>
+                <a:spcPct val="90000"/>
+              </a:lnSpc>
+              <a:spcBef>
+                <a:spcPct val="20000"/>
+              </a:spcBef>
+              <a:spcAft>
+                <a:spcPts val="0"/>
+              </a:spcAft>
+              <a:buClrTx/>
+              <a:buSzPct val="90000"/>
+              <a:buFont typeface="Arial" pitchFamily="34" charset="0"/>
+              <a:buChar char="•"/>
+              <a:tabLst/>
+              <a:defRPr sz="3600" kern="1200" spc="0" baseline="0">
+                <a:gradFill>
+                  <a:gsLst>
+                    <a:gs pos="1250">
+                      <a:schemeClr val="tx1"/>
+                    </a:gs>
+                    <a:gs pos="99000">
+                      <a:schemeClr val="tx1"/>
+                    </a:gs>
+                  </a:gsLst>
+                  <a:lin ang="5400000" scaled="0"/>
+                </a:gradFill>
+                <a:latin typeface="+mj-lt"/>
+                <a:ea typeface="+mn-ea"/>
+                <a:cs typeface="+mn-cs"/>
+              </a:defRPr>
+            </a:lvl1pPr>
+            <a:lvl2pPr marL="584200" marR="0" indent="-241300" algn="l" defTabSz="932742" rtl="0" eaLnBrk="1" fontAlgn="auto" latinLnBrk="0" hangingPunct="1">
+              <a:lnSpc>
+                <a:spcPct val="90000"/>
+              </a:lnSpc>
+              <a:spcBef>
+                <a:spcPct val="20000"/>
+              </a:spcBef>
+              <a:spcAft>
+                <a:spcPts val="0"/>
+              </a:spcAft>
+              <a:buClrTx/>
+              <a:buSzPct val="90000"/>
+              <a:buFont typeface="Arial" pitchFamily="34" charset="0"/>
+              <a:buChar char="•"/>
+              <a:tabLst/>
+              <a:defRPr sz="2400" kern="1200" spc="0" baseline="0">
+                <a:gradFill>
+                  <a:gsLst>
+                    <a:gs pos="1250">
+                      <a:schemeClr val="tx1"/>
+                    </a:gs>
+                    <a:gs pos="99000">
+                      <a:schemeClr val="tx1"/>
+                    </a:gs>
+                  </a:gsLst>
+                  <a:lin ang="5400000" scaled="0"/>
+                </a:gradFill>
+                <a:latin typeface="+mn-lt"/>
+                <a:ea typeface="+mn-ea"/>
+                <a:cs typeface="+mn-cs"/>
+              </a:defRPr>
+            </a:lvl2pPr>
+            <a:lvl3pPr marL="800100" marR="0" indent="-228600" algn="l" defTabSz="932742" rtl="0" eaLnBrk="1" fontAlgn="auto" latinLnBrk="0" hangingPunct="1">
+              <a:lnSpc>
+                <a:spcPct val="90000"/>
+              </a:lnSpc>
+              <a:spcBef>
+                <a:spcPct val="20000"/>
+              </a:spcBef>
+              <a:spcAft>
+                <a:spcPts val="0"/>
+              </a:spcAft>
+              <a:buClrTx/>
+              <a:buSzPct val="90000"/>
+              <a:buFont typeface="Arial" pitchFamily="34" charset="0"/>
+              <a:buChar char="•"/>
+              <a:tabLst/>
+              <a:defRPr sz="2000" kern="1200" spc="0" baseline="0">
+                <a:gradFill>
+                  <a:gsLst>
+                    <a:gs pos="1250">
+                      <a:schemeClr val="tx1"/>
+                    </a:gs>
+                    <a:gs pos="99000">
+                      <a:schemeClr val="tx1"/>
+                    </a:gs>
+                  </a:gsLst>
+                  <a:lin ang="5400000" scaled="0"/>
+                </a:gradFill>
+                <a:latin typeface="+mn-lt"/>
+                <a:ea typeface="+mn-ea"/>
+                <a:cs typeface="+mn-cs"/>
+              </a:defRPr>
+            </a:lvl3pPr>
+            <a:lvl4pPr marL="1028700" marR="0" indent="-228600" algn="l" defTabSz="932742" rtl="0" eaLnBrk="1" fontAlgn="auto" latinLnBrk="0" hangingPunct="1">
+              <a:lnSpc>
+                <a:spcPct val="90000"/>
+              </a:lnSpc>
+              <a:spcBef>
+                <a:spcPct val="20000"/>
+              </a:spcBef>
+              <a:spcAft>
+                <a:spcPts val="0"/>
+              </a:spcAft>
+              <a:buClrTx/>
+              <a:buSzPct val="90000"/>
+              <a:buFont typeface="Arial" pitchFamily="34" charset="0"/>
+              <a:buChar char="•"/>
+              <a:tabLst/>
+              <a:defRPr sz="1800" kern="1200" spc="0" baseline="0">
+                <a:gradFill>
+                  <a:gsLst>
+                    <a:gs pos="1250">
+                      <a:schemeClr val="tx1"/>
+                    </a:gs>
+                    <a:gs pos="99000">
+                      <a:schemeClr val="tx1"/>
+                    </a:gs>
+                  </a:gsLst>
+                  <a:lin ang="5400000" scaled="0"/>
+                </a:gradFill>
+                <a:latin typeface="+mn-lt"/>
+                <a:ea typeface="+mn-ea"/>
+                <a:cs typeface="+mn-cs"/>
+              </a:defRPr>
+            </a:lvl4pPr>
+            <a:lvl5pPr marL="1257300" marR="0" indent="-228600" algn="l" defTabSz="932742" rtl="0" eaLnBrk="1" fontAlgn="auto" latinLnBrk="0" hangingPunct="1">
+              <a:lnSpc>
+                <a:spcPct val="90000"/>
+              </a:lnSpc>
+              <a:spcBef>
+                <a:spcPct val="20000"/>
+              </a:spcBef>
+              <a:spcAft>
+                <a:spcPts val="0"/>
+              </a:spcAft>
+              <a:buClrTx/>
+              <a:buSzPct val="90000"/>
+              <a:buFont typeface="Arial" pitchFamily="34" charset="0"/>
+              <a:buChar char="•"/>
+              <a:tabLst/>
+              <a:defRPr sz="1800" kern="1200" spc="0" baseline="0">
+                <a:gradFill>
+                  <a:gsLst>
+                    <a:gs pos="1250">
+                      <a:schemeClr val="tx1"/>
+                    </a:gs>
+                    <a:gs pos="99000">
+                      <a:schemeClr val="tx1"/>
+                    </a:gs>
+                  </a:gsLst>
+                  <a:lin ang="5400000" scaled="0"/>
+                </a:gradFill>
+                <a:latin typeface="+mn-lt"/>
+                <a:ea typeface="+mn-ea"/>
+                <a:cs typeface="+mn-cs"/>
+              </a:defRPr>
+            </a:lvl5pPr>
+            <a:lvl6pPr marL="2565040" indent="-233186" algn="l" defTabSz="932742" rtl="0" eaLnBrk="1" latinLnBrk="0" hangingPunct="1">
+              <a:spcBef>
+                <a:spcPct val="20000"/>
+              </a:spcBef>
+              <a:buFont typeface="Arial" pitchFamily="34" charset="0"/>
+              <a:buChar char="•"/>
+              <a:defRPr sz="2000" kern="1200">
+                <a:solidFill>
+                  <a:schemeClr val="tx1"/>
+                </a:solidFill>
+                <a:latin typeface="+mn-lt"/>
+                <a:ea typeface="+mn-ea"/>
+                <a:cs typeface="+mn-cs"/>
+              </a:defRPr>
+            </a:lvl6pPr>
+            <a:lvl7pPr marL="3031412" indent="-233186" algn="l" defTabSz="932742" rtl="0" eaLnBrk="1" latinLnBrk="0" hangingPunct="1">
+              <a:spcBef>
+                <a:spcPct val="20000"/>
+              </a:spcBef>
+              <a:buFont typeface="Arial" pitchFamily="34" charset="0"/>
+              <a:buChar char="•"/>
+              <a:defRPr sz="2000" kern="1200">
+                <a:solidFill>
+                  <a:schemeClr val="tx1"/>
+                </a:solidFill>
+                <a:latin typeface="+mn-lt"/>
+                <a:ea typeface="+mn-ea"/>
+                <a:cs typeface="+mn-cs"/>
+              </a:defRPr>
+            </a:lvl7pPr>
+            <a:lvl8pPr marL="3497783" indent="-233186" algn="l" defTabSz="932742" rtl="0" eaLnBrk="1" latinLnBrk="0" hangingPunct="1">
+              <a:spcBef>
+                <a:spcPct val="20000"/>
+              </a:spcBef>
+              <a:buFont typeface="Arial" pitchFamily="34" charset="0"/>
+              <a:buChar char="•"/>
+              <a:defRPr sz="2000" kern="1200">
+                <a:solidFill>
+                  <a:schemeClr val="tx1"/>
+                </a:solidFill>
+                <a:latin typeface="+mn-lt"/>
+                <a:ea typeface="+mn-ea"/>
+                <a:cs typeface="+mn-cs"/>
+              </a:defRPr>
+            </a:lvl8pPr>
+            <a:lvl9pPr marL="3964155" indent="-233186" algn="l" defTabSz="932742" rtl="0" eaLnBrk="1" latinLnBrk="0" hangingPunct="1">
+              <a:spcBef>
+                <a:spcPct val="20000"/>
+              </a:spcBef>
+              <a:buFont typeface="Arial" pitchFamily="34" charset="0"/>
+              <a:buChar char="•"/>
+              <a:defRPr sz="2000" kern="1200">
+                <a:solidFill>
+                  <a:schemeClr val="tx1"/>
+                </a:solidFill>
+                <a:latin typeface="+mn-lt"/>
+                <a:ea typeface="+mn-ea"/>
+                <a:cs typeface="+mn-cs"/>
+              </a:defRPr>
+            </a:lvl9pPr>
+          </a:lstStyle>
+          <a:p>
+            <a:pPr marL="0" indent="0">
+              <a:buNone/>
+            </a:pPr>
+            <a:r>
+              <a:rPr lang="en-US" dirty="0"/>
+              <a:t>Lifetime:</a:t>
+            </a:r>
+          </a:p>
+          <a:p>
+            <a:pPr marL="0" indent="0">
+              <a:buNone/>
+            </a:pPr>
+            <a:endParaRPr lang="en-US" dirty="0"/>
+          </a:p>
+          <a:p>
+            <a:pPr>
+              <a:buFontTx/>
+              <a:buChar char="-"/>
+            </a:pPr>
+            <a:r>
+              <a:rPr lang="en-US" dirty="0"/>
+              <a:t>Transient</a:t>
+            </a:r>
+          </a:p>
+          <a:p>
+            <a:pPr>
+              <a:buFontTx/>
+              <a:buChar char="-"/>
+            </a:pPr>
+            <a:r>
+              <a:rPr lang="en-US" dirty="0"/>
+              <a:t>Scoped</a:t>
+            </a:r>
+          </a:p>
+          <a:p>
+            <a:pPr>
+              <a:buFontTx/>
+              <a:buChar char="-"/>
+            </a:pPr>
+            <a:r>
+              <a:rPr lang="en-US" dirty="0"/>
+              <a:t>Singleton</a:t>
+            </a:r>
+          </a:p>
+          <a:p>
+            <a:pPr marL="0" indent="0">
+              <a:buNone/>
+            </a:pPr>
+            <a:endParaRPr lang="en-US" dirty="0"/>
+          </a:p>
+          <a:p>
+            <a:pPr marL="0" indent="0">
+              <a:buNone/>
+            </a:pPr>
+            <a:endParaRPr lang="da-DK" dirty="0"/>
+          </a:p>
+        </p:txBody>
+      </p:sp>
+    </p:spTree>
+    <p:extLst>
+      <p:ext uri="{BB962C8B-B14F-4D97-AF65-F5344CB8AC3E}">
+        <p14:creationId xmlns:p14="http://schemas.microsoft.com/office/powerpoint/2010/main" val="3908545536"/>
+      </p:ext>
+    </p:extLst>
+  </p:cSld>
+  <p:clrMapOvr>
+    <a:masterClrMapping/>
+  </p:clrMapOvr>
+  <p:transition>
+    <p:fade/>
+  </p:transition>
+  <p:timing>
+    <p:tnLst>
+      <p:par>
+        <p:cTn id="1" dur="indefinite" restart="never" nodeType="tmRoot">
+          <p:childTnLst>
+            <p:seq concurrent="1" nextAc="seek">
+              <p:cTn id="2" dur="indefinite" nodeType="mainSeq">
+                <p:childTnLst>
+                  <p:par>
+                    <p:cTn id="3" fill="hold">
+                      <p:stCondLst>
+                        <p:cond delay="indefinite"/>
+                      </p:stCondLst>
+                      <p:childTnLst>
+                        <p:par>
+                          <p:cTn id="4" fill="hold">
+                            <p:stCondLst>
+                              <p:cond delay="0"/>
+                            </p:stCondLst>
+                            <p:childTnLst>
+                              <p:par>
+                                <p:cTn id="5" presetID="1" presetClass="entr" presetSubtype="0" fill="hold" grpId="0" nodeType="clickEffect">
+                                  <p:stCondLst>
+                                    <p:cond delay="0"/>
+                                  </p:stCondLst>
+                                  <p:childTnLst>
+                                    <p:set>
+                                      <p:cBhvr>
+                                        <p:cTn id="6" dur="1" fill="hold">
+                                          <p:stCondLst>
+                                            <p:cond delay="0"/>
+                                          </p:stCondLst>
+                                        </p:cTn>
+                                        <p:tgtEl>
+                                          <p:spTgt spid="4"/>
+                                        </p:tgtEl>
+                                        <p:attrNameLst>
+                                          <p:attrName>style.visibility</p:attrName>
+                                        </p:attrNameLst>
+                                      </p:cBhvr>
+                                      <p:to>
+                                        <p:strVal val="visible"/>
+                                      </p:to>
+                                    </p:set>
+                                  </p:childTnLst>
+                                </p:cTn>
+                              </p:par>
+                            </p:childTnLst>
+                          </p:cTn>
+                        </p:par>
+                      </p:childTnLst>
+                    </p:cTn>
+                  </p:par>
+                </p:childTnLst>
+              </p:cTn>
+              <p:prevCondLst>
+                <p:cond evt="onPrev" delay="0">
+                  <p:tgtEl>
+                    <p:sldTgt/>
+                  </p:tgtEl>
+                </p:cond>
+              </p:prevCondLst>
+              <p:nextCondLst>
+                <p:cond evt="onNext" delay="0">
+                  <p:tgtEl>
+                    <p:sldTgt/>
+                  </p:tgtEl>
+                </p:cond>
+              </p:nextCondLst>
+            </p:seq>
+          </p:childTnLst>
+        </p:cTn>
+      </p:par>
+    </p:tnLst>
+    <p:bldLst>
+      <p:bldP spid="4" grpId="0"/>
+    </p:bldLst>
+  </p:timing>
+</p:sld>
+</file>
+
+<file path=ppt/slides/slide5.xml><?xml version="1.0" encoding="utf-8"?>
+<p:sld xmlns:a="http://schemas.openxmlformats.org/drawingml/2006/main" xmlns:r="http://schemas.openxmlformats.org/officeDocument/2006/relationships" xmlns:p="http://schemas.openxmlformats.org/presentationml/2006/main">
+  <p:cSld>
     <p:bg>
       <p:bgPr>
         <a:solidFill>
@@ -5822,42 +7374,37 @@
             <a:pPr marL="0" indent="0">
               <a:buNone/>
             </a:pPr>
-            <a:endParaRPr lang="en-US" dirty="0"/>
-          </a:p>
-          <a:p>
-            <a:pPr marL="0" indent="0">
-              <a:buNone/>
-            </a:pPr>
             <a:r>
               <a:rPr lang="en-US" dirty="0"/>
               <a:t>Static or sealed class or class in another assembly.</a:t>
-            </a:r>
-          </a:p>
-          <a:p>
-            <a:pPr marL="0" indent="0">
-              <a:buNone/>
-            </a:pPr>
-            <a:endParaRPr lang="en-US" dirty="0"/>
-          </a:p>
-          <a:p>
-            <a:pPr marL="0" indent="0">
-              <a:buNone/>
-            </a:pPr>
-            <a:r>
-              <a:rPr lang="en-US" dirty="0"/>
-              <a:t>TODO: Create wrapper which satisfies the required interface and calls the implementation (</a:t>
-            </a:r>
-            <a:r>
-              <a:rPr lang="en-US" dirty="0" err="1"/>
-              <a:t>adaptee</a:t>
-            </a:r>
-            <a:r>
-              <a:rPr lang="en-US" dirty="0"/>
-              <a:t>).</a:t>
             </a:r>
           </a:p>
         </p:txBody>
       </p:sp>
+      <p:pic>
+        <p:nvPicPr>
+          <p:cNvPr id="3" name="Picture 2"/>
+          <p:cNvPicPr>
+            <a:picLocks noChangeAspect="1"/>
+          </p:cNvPicPr>
+          <p:nvPr/>
+        </p:nvPicPr>
+        <p:blipFill>
+          <a:blip r:embed="rId2"/>
+          <a:stretch>
+            <a:fillRect/>
+          </a:stretch>
+        </p:blipFill>
+        <p:spPr>
+          <a:xfrm>
+            <a:off x="2765830" y="3131506"/>
+            <a:ext cx="6431346" cy="3741601"/>
+          </a:xfrm>
+          <a:prstGeom prst="rect">
+            <a:avLst/>
+          </a:prstGeom>
+        </p:spPr>
+      </p:pic>
     </p:spTree>
     <p:extLst>
       <p:ext uri="{BB962C8B-B14F-4D97-AF65-F5344CB8AC3E}">
@@ -5874,7 +7421,7 @@
 </p:sld>
 </file>
 
-<file path=ppt/slides/slide5.xml><?xml version="1.0" encoding="utf-8"?>
+<file path=ppt/slides/slide6.xml><?xml version="1.0" encoding="utf-8"?>
 <p:sld xmlns:a="http://schemas.openxmlformats.org/drawingml/2006/main" xmlns:r="http://schemas.openxmlformats.org/officeDocument/2006/relationships" xmlns:p="http://schemas.openxmlformats.org/presentationml/2006/main">
   <p:cSld>
     <p:spTree>
@@ -6205,417 +7752,34 @@
           </a:p>
         </p:txBody>
       </p:sp>
-    </p:spTree>
-    <p:extLst>
-      <p:ext uri="{BB962C8B-B14F-4D97-AF65-F5344CB8AC3E}">
-        <p14:creationId xmlns:p14="http://schemas.microsoft.com/office/powerpoint/2010/main" val="2884813729"/>
-      </p:ext>
-    </p:extLst>
-  </p:cSld>
-  <p:clrMapOvr>
-    <a:masterClrMapping/>
-  </p:clrMapOvr>
-  <p:transition>
-    <p:fade/>
-  </p:transition>
-</p:sld>
-</file>
-
-<file path=ppt/slides/slide6.xml><?xml version="1.0" encoding="utf-8"?>
-<p:sld xmlns:a="http://schemas.openxmlformats.org/drawingml/2006/main" xmlns:r="http://schemas.openxmlformats.org/officeDocument/2006/relationships" xmlns:p="http://schemas.openxmlformats.org/presentationml/2006/main">
-  <p:cSld>
-    <p:bg>
-      <p:bgPr>
-        <a:solidFill>
-          <a:srgbClr val="505050"/>
-        </a:solidFill>
-        <a:effectLst/>
-      </p:bgPr>
-    </p:bg>
-    <p:spTree>
-      <p:nvGrpSpPr>
-        <p:cNvPr id="1" name=""/>
-        <p:cNvGrpSpPr/>
-        <p:nvPr/>
-      </p:nvGrpSpPr>
-      <p:grpSpPr>
-        <a:xfrm>
-          <a:off x="0" y="0"/>
-          <a:ext cx="0" cy="0"/>
-          <a:chOff x="0" y="0"/>
-          <a:chExt cx="0" cy="0"/>
-        </a:xfrm>
-      </p:grpSpPr>
-      <p:sp>
-        <p:nvSpPr>
-          <p:cNvPr id="2" name="Titel 1"/>
-          <p:cNvSpPr txBox="1">
-            <a:spLocks/>
-          </p:cNvSpPr>
+      <p:pic>
+        <p:nvPicPr>
+          <p:cNvPr id="4" name="Picture 3"/>
+          <p:cNvPicPr>
+            <a:picLocks noChangeAspect="1"/>
+          </p:cNvPicPr>
           <p:nvPr/>
-        </p:nvSpPr>
+        </p:nvPicPr>
+        <p:blipFill>
+          <a:blip r:embed="rId2"/>
+          <a:stretch>
+            <a:fillRect/>
+          </a:stretch>
+        </p:blipFill>
         <p:spPr>
           <a:xfrm>
-            <a:off x="273844" y="295275"/>
-            <a:ext cx="8778875" cy="917575"/>
+            <a:off x="118516" y="3314384"/>
+            <a:ext cx="9103429" cy="3590905"/>
           </a:xfrm>
           <a:prstGeom prst="rect">
             <a:avLst/>
           </a:prstGeom>
         </p:spPr>
-        <p:txBody>
-          <a:bodyPr vert="horz" wrap="square" lIns="146304" tIns="91440" rIns="146304" bIns="91440" rtlCol="0" anchor="t">
-            <a:noAutofit/>
-          </a:bodyPr>
-          <a:lstStyle>
-            <a:lvl1pPr algn="l" defTabSz="932742" rtl="0" eaLnBrk="1" latinLnBrk="0" hangingPunct="1">
-              <a:lnSpc>
-                <a:spcPct val="90000"/>
-              </a:lnSpc>
-              <a:spcBef>
-                <a:spcPct val="0"/>
-              </a:spcBef>
-              <a:buNone/>
-              <a:defRPr lang="en-US" sz="4800" b="0" kern="1200" cap="none" spc="-102" baseline="0" dirty="0" smtClean="0">
-                <a:ln w="3175">
-                  <a:noFill/>
-                </a:ln>
-                <a:gradFill>
-                  <a:gsLst>
-                    <a:gs pos="1250">
-                      <a:schemeClr val="tx1"/>
-                    </a:gs>
-                    <a:gs pos="100000">
-                      <a:schemeClr val="tx1"/>
-                    </a:gs>
-                  </a:gsLst>
-                  <a:lin ang="5400000" scaled="0"/>
-                </a:gradFill>
-                <a:effectLst/>
-                <a:latin typeface="+mj-lt"/>
-                <a:ea typeface="+mn-ea"/>
-                <a:cs typeface="Segoe UI" pitchFamily="34" charset="0"/>
-              </a:defRPr>
-            </a:lvl1pPr>
-          </a:lstStyle>
-          <a:p>
-            <a:r>
-              <a:rPr lang="en-US" dirty="0"/>
-              <a:t>Singleton</a:t>
-            </a:r>
-          </a:p>
-        </p:txBody>
-      </p:sp>
-      <p:sp>
-        <p:nvSpPr>
-          <p:cNvPr id="3" name="Pladsholder til indhold 2"/>
-          <p:cNvSpPr txBox="1">
-            <a:spLocks/>
-          </p:cNvSpPr>
-          <p:nvPr/>
-        </p:nvSpPr>
-        <p:spPr>
-          <a:xfrm>
-            <a:off x="273844" y="1212850"/>
-            <a:ext cx="8778875" cy="5393338"/>
-          </a:xfrm>
-          <a:prstGeom prst="rect">
-            <a:avLst/>
-          </a:prstGeom>
-        </p:spPr>
-        <p:txBody>
-          <a:bodyPr vert="horz" wrap="square" lIns="146304" tIns="91440" rIns="146304" bIns="91440" rtlCol="0">
-            <a:normAutofit lnSpcReduction="10000"/>
-          </a:bodyPr>
-          <a:lstStyle>
-            <a:lvl1pPr marL="342900" marR="0" indent="-342900" algn="l" defTabSz="932742" rtl="0" eaLnBrk="1" fontAlgn="auto" latinLnBrk="0" hangingPunct="1">
-              <a:lnSpc>
-                <a:spcPct val="90000"/>
-              </a:lnSpc>
-              <a:spcBef>
-                <a:spcPct val="20000"/>
-              </a:spcBef>
-              <a:spcAft>
-                <a:spcPts val="0"/>
-              </a:spcAft>
-              <a:buClrTx/>
-              <a:buSzPct val="90000"/>
-              <a:buFont typeface="Arial" pitchFamily="34" charset="0"/>
-              <a:buChar char="•"/>
-              <a:tabLst/>
-              <a:defRPr sz="3600" kern="1200" spc="0" baseline="0">
-                <a:gradFill>
-                  <a:gsLst>
-                    <a:gs pos="1250">
-                      <a:schemeClr val="tx1"/>
-                    </a:gs>
-                    <a:gs pos="99000">
-                      <a:schemeClr val="tx1"/>
-                    </a:gs>
-                  </a:gsLst>
-                  <a:lin ang="5400000" scaled="0"/>
-                </a:gradFill>
-                <a:latin typeface="+mj-lt"/>
-                <a:ea typeface="+mn-ea"/>
-                <a:cs typeface="+mn-cs"/>
-              </a:defRPr>
-            </a:lvl1pPr>
-            <a:lvl2pPr marL="584200" marR="0" indent="-241300" algn="l" defTabSz="932742" rtl="0" eaLnBrk="1" fontAlgn="auto" latinLnBrk="0" hangingPunct="1">
-              <a:lnSpc>
-                <a:spcPct val="90000"/>
-              </a:lnSpc>
-              <a:spcBef>
-                <a:spcPct val="20000"/>
-              </a:spcBef>
-              <a:spcAft>
-                <a:spcPts val="0"/>
-              </a:spcAft>
-              <a:buClrTx/>
-              <a:buSzPct val="90000"/>
-              <a:buFont typeface="Arial" pitchFamily="34" charset="0"/>
-              <a:buChar char="•"/>
-              <a:tabLst/>
-              <a:defRPr sz="2400" kern="1200" spc="0" baseline="0">
-                <a:gradFill>
-                  <a:gsLst>
-                    <a:gs pos="1250">
-                      <a:schemeClr val="tx1"/>
-                    </a:gs>
-                    <a:gs pos="99000">
-                      <a:schemeClr val="tx1"/>
-                    </a:gs>
-                  </a:gsLst>
-                  <a:lin ang="5400000" scaled="0"/>
-                </a:gradFill>
-                <a:latin typeface="+mn-lt"/>
-                <a:ea typeface="+mn-ea"/>
-                <a:cs typeface="+mn-cs"/>
-              </a:defRPr>
-            </a:lvl2pPr>
-            <a:lvl3pPr marL="800100" marR="0" indent="-228600" algn="l" defTabSz="932742" rtl="0" eaLnBrk="1" fontAlgn="auto" latinLnBrk="0" hangingPunct="1">
-              <a:lnSpc>
-                <a:spcPct val="90000"/>
-              </a:lnSpc>
-              <a:spcBef>
-                <a:spcPct val="20000"/>
-              </a:spcBef>
-              <a:spcAft>
-                <a:spcPts val="0"/>
-              </a:spcAft>
-              <a:buClrTx/>
-              <a:buSzPct val="90000"/>
-              <a:buFont typeface="Arial" pitchFamily="34" charset="0"/>
-              <a:buChar char="•"/>
-              <a:tabLst/>
-              <a:defRPr sz="2000" kern="1200" spc="0" baseline="0">
-                <a:gradFill>
-                  <a:gsLst>
-                    <a:gs pos="1250">
-                      <a:schemeClr val="tx1"/>
-                    </a:gs>
-                    <a:gs pos="99000">
-                      <a:schemeClr val="tx1"/>
-                    </a:gs>
-                  </a:gsLst>
-                  <a:lin ang="5400000" scaled="0"/>
-                </a:gradFill>
-                <a:latin typeface="+mn-lt"/>
-                <a:ea typeface="+mn-ea"/>
-                <a:cs typeface="+mn-cs"/>
-              </a:defRPr>
-            </a:lvl3pPr>
-            <a:lvl4pPr marL="1028700" marR="0" indent="-228600" algn="l" defTabSz="932742" rtl="0" eaLnBrk="1" fontAlgn="auto" latinLnBrk="0" hangingPunct="1">
-              <a:lnSpc>
-                <a:spcPct val="90000"/>
-              </a:lnSpc>
-              <a:spcBef>
-                <a:spcPct val="20000"/>
-              </a:spcBef>
-              <a:spcAft>
-                <a:spcPts val="0"/>
-              </a:spcAft>
-              <a:buClrTx/>
-              <a:buSzPct val="90000"/>
-              <a:buFont typeface="Arial" pitchFamily="34" charset="0"/>
-              <a:buChar char="•"/>
-              <a:tabLst/>
-              <a:defRPr sz="1800" kern="1200" spc="0" baseline="0">
-                <a:gradFill>
-                  <a:gsLst>
-                    <a:gs pos="1250">
-                      <a:schemeClr val="tx1"/>
-                    </a:gs>
-                    <a:gs pos="99000">
-                      <a:schemeClr val="tx1"/>
-                    </a:gs>
-                  </a:gsLst>
-                  <a:lin ang="5400000" scaled="0"/>
-                </a:gradFill>
-                <a:latin typeface="+mn-lt"/>
-                <a:ea typeface="+mn-ea"/>
-                <a:cs typeface="+mn-cs"/>
-              </a:defRPr>
-            </a:lvl4pPr>
-            <a:lvl5pPr marL="1257300" marR="0" indent="-228600" algn="l" defTabSz="932742" rtl="0" eaLnBrk="1" fontAlgn="auto" latinLnBrk="0" hangingPunct="1">
-              <a:lnSpc>
-                <a:spcPct val="90000"/>
-              </a:lnSpc>
-              <a:spcBef>
-                <a:spcPct val="20000"/>
-              </a:spcBef>
-              <a:spcAft>
-                <a:spcPts val="0"/>
-              </a:spcAft>
-              <a:buClrTx/>
-              <a:buSzPct val="90000"/>
-              <a:buFont typeface="Arial" pitchFamily="34" charset="0"/>
-              <a:buChar char="•"/>
-              <a:tabLst/>
-              <a:defRPr sz="1800" kern="1200" spc="0" baseline="0">
-                <a:gradFill>
-                  <a:gsLst>
-                    <a:gs pos="1250">
-                      <a:schemeClr val="tx1"/>
-                    </a:gs>
-                    <a:gs pos="99000">
-                      <a:schemeClr val="tx1"/>
-                    </a:gs>
-                  </a:gsLst>
-                  <a:lin ang="5400000" scaled="0"/>
-                </a:gradFill>
-                <a:latin typeface="+mn-lt"/>
-                <a:ea typeface="+mn-ea"/>
-                <a:cs typeface="+mn-cs"/>
-              </a:defRPr>
-            </a:lvl5pPr>
-            <a:lvl6pPr marL="2565040" indent="-233186" algn="l" defTabSz="932742" rtl="0" eaLnBrk="1" latinLnBrk="0" hangingPunct="1">
-              <a:spcBef>
-                <a:spcPct val="20000"/>
-              </a:spcBef>
-              <a:buFont typeface="Arial" pitchFamily="34" charset="0"/>
-              <a:buChar char="•"/>
-              <a:defRPr sz="2000" kern="1200">
-                <a:solidFill>
-                  <a:schemeClr val="tx1"/>
-                </a:solidFill>
-                <a:latin typeface="+mn-lt"/>
-                <a:ea typeface="+mn-ea"/>
-                <a:cs typeface="+mn-cs"/>
-              </a:defRPr>
-            </a:lvl6pPr>
-            <a:lvl7pPr marL="3031412" indent="-233186" algn="l" defTabSz="932742" rtl="0" eaLnBrk="1" latinLnBrk="0" hangingPunct="1">
-              <a:spcBef>
-                <a:spcPct val="20000"/>
-              </a:spcBef>
-              <a:buFont typeface="Arial" pitchFamily="34" charset="0"/>
-              <a:buChar char="•"/>
-              <a:defRPr sz="2000" kern="1200">
-                <a:solidFill>
-                  <a:schemeClr val="tx1"/>
-                </a:solidFill>
-                <a:latin typeface="+mn-lt"/>
-                <a:ea typeface="+mn-ea"/>
-                <a:cs typeface="+mn-cs"/>
-              </a:defRPr>
-            </a:lvl7pPr>
-            <a:lvl8pPr marL="3497783" indent="-233186" algn="l" defTabSz="932742" rtl="0" eaLnBrk="1" latinLnBrk="0" hangingPunct="1">
-              <a:spcBef>
-                <a:spcPct val="20000"/>
-              </a:spcBef>
-              <a:buFont typeface="Arial" pitchFamily="34" charset="0"/>
-              <a:buChar char="•"/>
-              <a:defRPr sz="2000" kern="1200">
-                <a:solidFill>
-                  <a:schemeClr val="tx1"/>
-                </a:solidFill>
-                <a:latin typeface="+mn-lt"/>
-                <a:ea typeface="+mn-ea"/>
-                <a:cs typeface="+mn-cs"/>
-              </a:defRPr>
-            </a:lvl8pPr>
-            <a:lvl9pPr marL="3964155" indent="-233186" algn="l" defTabSz="932742" rtl="0" eaLnBrk="1" latinLnBrk="0" hangingPunct="1">
-              <a:spcBef>
-                <a:spcPct val="20000"/>
-              </a:spcBef>
-              <a:buFont typeface="Arial" pitchFamily="34" charset="0"/>
-              <a:buChar char="•"/>
-              <a:defRPr sz="2000" kern="1200">
-                <a:solidFill>
-                  <a:schemeClr val="tx1"/>
-                </a:solidFill>
-                <a:latin typeface="+mn-lt"/>
-                <a:ea typeface="+mn-ea"/>
-                <a:cs typeface="+mn-cs"/>
-              </a:defRPr>
-            </a:lvl9pPr>
-          </a:lstStyle>
-          <a:p>
-            <a:pPr marL="0" indent="0">
-              <a:buNone/>
-            </a:pPr>
-            <a:r>
-              <a:rPr lang="en-US" dirty="0"/>
-              <a:t>Only ever one single instance of a given type.</a:t>
-            </a:r>
-          </a:p>
-          <a:p>
-            <a:pPr marL="0" indent="0">
-              <a:buNone/>
-            </a:pPr>
-            <a:endParaRPr lang="en-US" dirty="0"/>
-          </a:p>
-          <a:p>
-            <a:pPr marL="0" indent="0">
-              <a:buNone/>
-            </a:pPr>
-            <a:r>
-              <a:rPr lang="en-US" dirty="0"/>
-              <a:t>Considered an anti-pattern by many, it:</a:t>
-            </a:r>
-          </a:p>
-          <a:p>
-            <a:pPr marL="0" indent="0">
-              <a:buNone/>
-            </a:pPr>
-            <a:endParaRPr lang="en-US" dirty="0"/>
-          </a:p>
-          <a:p>
-            <a:pPr>
-              <a:buFontTx/>
-              <a:buChar char="-"/>
-            </a:pPr>
-            <a:r>
-              <a:rPr lang="en-US" dirty="0"/>
-              <a:t>is overused</a:t>
-            </a:r>
-          </a:p>
-          <a:p>
-            <a:pPr>
-              <a:buFontTx/>
-              <a:buChar char="-"/>
-            </a:pPr>
-            <a:r>
-              <a:rPr lang="en-US" dirty="0"/>
-              <a:t>introduces unnecessary restrictions in situations where a sole instance of a class is not actually required</a:t>
-            </a:r>
-          </a:p>
-          <a:p>
-            <a:pPr>
-              <a:buFontTx/>
-              <a:buChar char="-"/>
-            </a:pPr>
-            <a:r>
-              <a:rPr lang="en-US" dirty="0"/>
-              <a:t>introduces global state into an application</a:t>
-            </a:r>
-            <a:endParaRPr lang="en-US" dirty="0"/>
-          </a:p>
-        </p:txBody>
-      </p:sp>
+      </p:pic>
     </p:spTree>
     <p:extLst>
       <p:ext uri="{BB962C8B-B14F-4D97-AF65-F5344CB8AC3E}">
-        <p14:creationId xmlns:p14="http://schemas.microsoft.com/office/powerpoint/2010/main" val="3960057300"/>
+        <p14:creationId xmlns:p14="http://schemas.microsoft.com/office/powerpoint/2010/main" val="2884813729"/>
       </p:ext>
     </p:extLst>
   </p:cSld>
@@ -6708,6 +7872,412 @@
           <a:p>
             <a:r>
               <a:rPr lang="en-US" dirty="0"/>
+              <a:t>Singleton</a:t>
+            </a:r>
+          </a:p>
+        </p:txBody>
+      </p:sp>
+      <p:sp>
+        <p:nvSpPr>
+          <p:cNvPr id="3" name="Pladsholder til indhold 2"/>
+          <p:cNvSpPr txBox="1">
+            <a:spLocks/>
+          </p:cNvSpPr>
+          <p:nvPr/>
+        </p:nvSpPr>
+        <p:spPr>
+          <a:xfrm>
+            <a:off x="273844" y="1212850"/>
+            <a:ext cx="8778875" cy="5393338"/>
+          </a:xfrm>
+          <a:prstGeom prst="rect">
+            <a:avLst/>
+          </a:prstGeom>
+        </p:spPr>
+        <p:txBody>
+          <a:bodyPr vert="horz" wrap="square" lIns="146304" tIns="91440" rIns="146304" bIns="91440" rtlCol="0">
+            <a:normAutofit lnSpcReduction="10000"/>
+          </a:bodyPr>
+          <a:lstStyle>
+            <a:lvl1pPr marL="342900" marR="0" indent="-342900" algn="l" defTabSz="932742" rtl="0" eaLnBrk="1" fontAlgn="auto" latinLnBrk="0" hangingPunct="1">
+              <a:lnSpc>
+                <a:spcPct val="90000"/>
+              </a:lnSpc>
+              <a:spcBef>
+                <a:spcPct val="20000"/>
+              </a:spcBef>
+              <a:spcAft>
+                <a:spcPts val="0"/>
+              </a:spcAft>
+              <a:buClrTx/>
+              <a:buSzPct val="90000"/>
+              <a:buFont typeface="Arial" pitchFamily="34" charset="0"/>
+              <a:buChar char="•"/>
+              <a:tabLst/>
+              <a:defRPr sz="3600" kern="1200" spc="0" baseline="0">
+                <a:gradFill>
+                  <a:gsLst>
+                    <a:gs pos="1250">
+                      <a:schemeClr val="tx1"/>
+                    </a:gs>
+                    <a:gs pos="99000">
+                      <a:schemeClr val="tx1"/>
+                    </a:gs>
+                  </a:gsLst>
+                  <a:lin ang="5400000" scaled="0"/>
+                </a:gradFill>
+                <a:latin typeface="+mj-lt"/>
+                <a:ea typeface="+mn-ea"/>
+                <a:cs typeface="+mn-cs"/>
+              </a:defRPr>
+            </a:lvl1pPr>
+            <a:lvl2pPr marL="584200" marR="0" indent="-241300" algn="l" defTabSz="932742" rtl="0" eaLnBrk="1" fontAlgn="auto" latinLnBrk="0" hangingPunct="1">
+              <a:lnSpc>
+                <a:spcPct val="90000"/>
+              </a:lnSpc>
+              <a:spcBef>
+                <a:spcPct val="20000"/>
+              </a:spcBef>
+              <a:spcAft>
+                <a:spcPts val="0"/>
+              </a:spcAft>
+              <a:buClrTx/>
+              <a:buSzPct val="90000"/>
+              <a:buFont typeface="Arial" pitchFamily="34" charset="0"/>
+              <a:buChar char="•"/>
+              <a:tabLst/>
+              <a:defRPr sz="2400" kern="1200" spc="0" baseline="0">
+                <a:gradFill>
+                  <a:gsLst>
+                    <a:gs pos="1250">
+                      <a:schemeClr val="tx1"/>
+                    </a:gs>
+                    <a:gs pos="99000">
+                      <a:schemeClr val="tx1"/>
+                    </a:gs>
+                  </a:gsLst>
+                  <a:lin ang="5400000" scaled="0"/>
+                </a:gradFill>
+                <a:latin typeface="+mn-lt"/>
+                <a:ea typeface="+mn-ea"/>
+                <a:cs typeface="+mn-cs"/>
+              </a:defRPr>
+            </a:lvl2pPr>
+            <a:lvl3pPr marL="800100" marR="0" indent="-228600" algn="l" defTabSz="932742" rtl="0" eaLnBrk="1" fontAlgn="auto" latinLnBrk="0" hangingPunct="1">
+              <a:lnSpc>
+                <a:spcPct val="90000"/>
+              </a:lnSpc>
+              <a:spcBef>
+                <a:spcPct val="20000"/>
+              </a:spcBef>
+              <a:spcAft>
+                <a:spcPts val="0"/>
+              </a:spcAft>
+              <a:buClrTx/>
+              <a:buSzPct val="90000"/>
+              <a:buFont typeface="Arial" pitchFamily="34" charset="0"/>
+              <a:buChar char="•"/>
+              <a:tabLst/>
+              <a:defRPr sz="2000" kern="1200" spc="0" baseline="0">
+                <a:gradFill>
+                  <a:gsLst>
+                    <a:gs pos="1250">
+                      <a:schemeClr val="tx1"/>
+                    </a:gs>
+                    <a:gs pos="99000">
+                      <a:schemeClr val="tx1"/>
+                    </a:gs>
+                  </a:gsLst>
+                  <a:lin ang="5400000" scaled="0"/>
+                </a:gradFill>
+                <a:latin typeface="+mn-lt"/>
+                <a:ea typeface="+mn-ea"/>
+                <a:cs typeface="+mn-cs"/>
+              </a:defRPr>
+            </a:lvl3pPr>
+            <a:lvl4pPr marL="1028700" marR="0" indent="-228600" algn="l" defTabSz="932742" rtl="0" eaLnBrk="1" fontAlgn="auto" latinLnBrk="0" hangingPunct="1">
+              <a:lnSpc>
+                <a:spcPct val="90000"/>
+              </a:lnSpc>
+              <a:spcBef>
+                <a:spcPct val="20000"/>
+              </a:spcBef>
+              <a:spcAft>
+                <a:spcPts val="0"/>
+              </a:spcAft>
+              <a:buClrTx/>
+              <a:buSzPct val="90000"/>
+              <a:buFont typeface="Arial" pitchFamily="34" charset="0"/>
+              <a:buChar char="•"/>
+              <a:tabLst/>
+              <a:defRPr sz="1800" kern="1200" spc="0" baseline="0">
+                <a:gradFill>
+                  <a:gsLst>
+                    <a:gs pos="1250">
+                      <a:schemeClr val="tx1"/>
+                    </a:gs>
+                    <a:gs pos="99000">
+                      <a:schemeClr val="tx1"/>
+                    </a:gs>
+                  </a:gsLst>
+                  <a:lin ang="5400000" scaled="0"/>
+                </a:gradFill>
+                <a:latin typeface="+mn-lt"/>
+                <a:ea typeface="+mn-ea"/>
+                <a:cs typeface="+mn-cs"/>
+              </a:defRPr>
+            </a:lvl4pPr>
+            <a:lvl5pPr marL="1257300" marR="0" indent="-228600" algn="l" defTabSz="932742" rtl="0" eaLnBrk="1" fontAlgn="auto" latinLnBrk="0" hangingPunct="1">
+              <a:lnSpc>
+                <a:spcPct val="90000"/>
+              </a:lnSpc>
+              <a:spcBef>
+                <a:spcPct val="20000"/>
+              </a:spcBef>
+              <a:spcAft>
+                <a:spcPts val="0"/>
+              </a:spcAft>
+              <a:buClrTx/>
+              <a:buSzPct val="90000"/>
+              <a:buFont typeface="Arial" pitchFamily="34" charset="0"/>
+              <a:buChar char="•"/>
+              <a:tabLst/>
+              <a:defRPr sz="1800" kern="1200" spc="0" baseline="0">
+                <a:gradFill>
+                  <a:gsLst>
+                    <a:gs pos="1250">
+                      <a:schemeClr val="tx1"/>
+                    </a:gs>
+                    <a:gs pos="99000">
+                      <a:schemeClr val="tx1"/>
+                    </a:gs>
+                  </a:gsLst>
+                  <a:lin ang="5400000" scaled="0"/>
+                </a:gradFill>
+                <a:latin typeface="+mn-lt"/>
+                <a:ea typeface="+mn-ea"/>
+                <a:cs typeface="+mn-cs"/>
+              </a:defRPr>
+            </a:lvl5pPr>
+            <a:lvl6pPr marL="2565040" indent="-233186" algn="l" defTabSz="932742" rtl="0" eaLnBrk="1" latinLnBrk="0" hangingPunct="1">
+              <a:spcBef>
+                <a:spcPct val="20000"/>
+              </a:spcBef>
+              <a:buFont typeface="Arial" pitchFamily="34" charset="0"/>
+              <a:buChar char="•"/>
+              <a:defRPr sz="2000" kern="1200">
+                <a:solidFill>
+                  <a:schemeClr val="tx1"/>
+                </a:solidFill>
+                <a:latin typeface="+mn-lt"/>
+                <a:ea typeface="+mn-ea"/>
+                <a:cs typeface="+mn-cs"/>
+              </a:defRPr>
+            </a:lvl6pPr>
+            <a:lvl7pPr marL="3031412" indent="-233186" algn="l" defTabSz="932742" rtl="0" eaLnBrk="1" latinLnBrk="0" hangingPunct="1">
+              <a:spcBef>
+                <a:spcPct val="20000"/>
+              </a:spcBef>
+              <a:buFont typeface="Arial" pitchFamily="34" charset="0"/>
+              <a:buChar char="•"/>
+              <a:defRPr sz="2000" kern="1200">
+                <a:solidFill>
+                  <a:schemeClr val="tx1"/>
+                </a:solidFill>
+                <a:latin typeface="+mn-lt"/>
+                <a:ea typeface="+mn-ea"/>
+                <a:cs typeface="+mn-cs"/>
+              </a:defRPr>
+            </a:lvl7pPr>
+            <a:lvl8pPr marL="3497783" indent="-233186" algn="l" defTabSz="932742" rtl="0" eaLnBrk="1" latinLnBrk="0" hangingPunct="1">
+              <a:spcBef>
+                <a:spcPct val="20000"/>
+              </a:spcBef>
+              <a:buFont typeface="Arial" pitchFamily="34" charset="0"/>
+              <a:buChar char="•"/>
+              <a:defRPr sz="2000" kern="1200">
+                <a:solidFill>
+                  <a:schemeClr val="tx1"/>
+                </a:solidFill>
+                <a:latin typeface="+mn-lt"/>
+                <a:ea typeface="+mn-ea"/>
+                <a:cs typeface="+mn-cs"/>
+              </a:defRPr>
+            </a:lvl8pPr>
+            <a:lvl9pPr marL="3964155" indent="-233186" algn="l" defTabSz="932742" rtl="0" eaLnBrk="1" latinLnBrk="0" hangingPunct="1">
+              <a:spcBef>
+                <a:spcPct val="20000"/>
+              </a:spcBef>
+              <a:buFont typeface="Arial" pitchFamily="34" charset="0"/>
+              <a:buChar char="•"/>
+              <a:defRPr sz="2000" kern="1200">
+                <a:solidFill>
+                  <a:schemeClr val="tx1"/>
+                </a:solidFill>
+                <a:latin typeface="+mn-lt"/>
+                <a:ea typeface="+mn-ea"/>
+                <a:cs typeface="+mn-cs"/>
+              </a:defRPr>
+            </a:lvl9pPr>
+          </a:lstStyle>
+          <a:p>
+            <a:pPr marL="0" indent="0">
+              <a:buNone/>
+            </a:pPr>
+            <a:r>
+              <a:rPr lang="en-US" dirty="0"/>
+              <a:t>Only ever one single instance of a given type.</a:t>
+            </a:r>
+          </a:p>
+          <a:p>
+            <a:pPr marL="0" indent="0">
+              <a:buNone/>
+            </a:pPr>
+            <a:endParaRPr lang="en-US" dirty="0"/>
+          </a:p>
+          <a:p>
+            <a:pPr marL="0" indent="0">
+              <a:buNone/>
+            </a:pPr>
+            <a:r>
+              <a:rPr lang="en-US" dirty="0"/>
+              <a:t>Considered an anti-pattern by many, it:</a:t>
+            </a:r>
+          </a:p>
+          <a:p>
+            <a:pPr marL="0" indent="0">
+              <a:buNone/>
+            </a:pPr>
+            <a:endParaRPr lang="en-US" dirty="0"/>
+          </a:p>
+          <a:p>
+            <a:pPr>
+              <a:buFontTx/>
+              <a:buChar char="-"/>
+            </a:pPr>
+            <a:r>
+              <a:rPr lang="en-US" dirty="0"/>
+              <a:t>is overused</a:t>
+            </a:r>
+          </a:p>
+          <a:p>
+            <a:pPr>
+              <a:buFontTx/>
+              <a:buChar char="-"/>
+            </a:pPr>
+            <a:r>
+              <a:rPr lang="en-US" dirty="0"/>
+              <a:t>introduces unnecessary restrictions in situations where a sole instance of a class is not actually required</a:t>
+            </a:r>
+          </a:p>
+          <a:p>
+            <a:pPr>
+              <a:buFontTx/>
+              <a:buChar char="-"/>
+            </a:pPr>
+            <a:r>
+              <a:rPr lang="en-US" dirty="0"/>
+              <a:t>introduces global state into an application</a:t>
+            </a:r>
+          </a:p>
+        </p:txBody>
+      </p:sp>
+    </p:spTree>
+    <p:extLst>
+      <p:ext uri="{BB962C8B-B14F-4D97-AF65-F5344CB8AC3E}">
+        <p14:creationId xmlns:p14="http://schemas.microsoft.com/office/powerpoint/2010/main" val="3960057300"/>
+      </p:ext>
+    </p:extLst>
+  </p:cSld>
+  <p:clrMapOvr>
+    <a:masterClrMapping/>
+  </p:clrMapOvr>
+  <p:transition>
+    <p:fade/>
+  </p:transition>
+</p:sld>
+</file>
+
+<file path=ppt/slides/slide8.xml><?xml version="1.0" encoding="utf-8"?>
+<p:sld xmlns:a="http://schemas.openxmlformats.org/drawingml/2006/main" xmlns:r="http://schemas.openxmlformats.org/officeDocument/2006/relationships" xmlns:p="http://schemas.openxmlformats.org/presentationml/2006/main">
+  <p:cSld>
+    <p:bg>
+      <p:bgPr>
+        <a:solidFill>
+          <a:srgbClr val="505050"/>
+        </a:solidFill>
+        <a:effectLst/>
+      </p:bgPr>
+    </p:bg>
+    <p:spTree>
+      <p:nvGrpSpPr>
+        <p:cNvPr id="1" name=""/>
+        <p:cNvGrpSpPr/>
+        <p:nvPr/>
+      </p:nvGrpSpPr>
+      <p:grpSpPr>
+        <a:xfrm>
+          <a:off x="0" y="0"/>
+          <a:ext cx="0" cy="0"/>
+          <a:chOff x="0" y="0"/>
+          <a:chExt cx="0" cy="0"/>
+        </a:xfrm>
+      </p:grpSpPr>
+      <p:sp>
+        <p:nvSpPr>
+          <p:cNvPr id="2" name="Titel 1"/>
+          <p:cNvSpPr txBox="1">
+            <a:spLocks/>
+          </p:cNvSpPr>
+          <p:nvPr/>
+        </p:nvSpPr>
+        <p:spPr>
+          <a:xfrm>
+            <a:off x="273844" y="295275"/>
+            <a:ext cx="8778875" cy="917575"/>
+          </a:xfrm>
+          <a:prstGeom prst="rect">
+            <a:avLst/>
+          </a:prstGeom>
+        </p:spPr>
+        <p:txBody>
+          <a:bodyPr vert="horz" wrap="square" lIns="146304" tIns="91440" rIns="146304" bIns="91440" rtlCol="0" anchor="t">
+            <a:noAutofit/>
+          </a:bodyPr>
+          <a:lstStyle>
+            <a:lvl1pPr algn="l" defTabSz="932742" rtl="0" eaLnBrk="1" latinLnBrk="0" hangingPunct="1">
+              <a:lnSpc>
+                <a:spcPct val="90000"/>
+              </a:lnSpc>
+              <a:spcBef>
+                <a:spcPct val="0"/>
+              </a:spcBef>
+              <a:buNone/>
+              <a:defRPr lang="en-US" sz="4800" b="0" kern="1200" cap="none" spc="-102" baseline="0" dirty="0" smtClean="0">
+                <a:ln w="3175">
+                  <a:noFill/>
+                </a:ln>
+                <a:gradFill>
+                  <a:gsLst>
+                    <a:gs pos="1250">
+                      <a:schemeClr val="tx1"/>
+                    </a:gs>
+                    <a:gs pos="100000">
+                      <a:schemeClr val="tx1"/>
+                    </a:gs>
+                  </a:gsLst>
+                  <a:lin ang="5400000" scaled="0"/>
+                </a:gradFill>
+                <a:effectLst/>
+                <a:latin typeface="+mj-lt"/>
+                <a:ea typeface="+mn-ea"/>
+                <a:cs typeface="Segoe UI" pitchFamily="34" charset="0"/>
+              </a:defRPr>
+            </a:lvl1pPr>
+          </a:lstStyle>
+          <a:p>
+            <a:r>
+              <a:rPr lang="en-US" dirty="0"/>
               <a:t>Singleton II</a:t>
             </a:r>
           </a:p>
@@ -7005,6 +8575,30 @@
           </a:p>
         </p:txBody>
       </p:sp>
+      <p:pic>
+        <p:nvPicPr>
+          <p:cNvPr id="4" name="Picture 3"/>
+          <p:cNvPicPr>
+            <a:picLocks noChangeAspect="1"/>
+          </p:cNvPicPr>
+          <p:nvPr/>
+        </p:nvPicPr>
+        <p:blipFill>
+          <a:blip r:embed="rId2"/>
+          <a:stretch>
+            <a:fillRect/>
+          </a:stretch>
+        </p:blipFill>
+        <p:spPr>
+          <a:xfrm>
+            <a:off x="1396996" y="4411652"/>
+            <a:ext cx="7767780" cy="2465052"/>
+          </a:xfrm>
+          <a:prstGeom prst="rect">
+            <a:avLst/>
+          </a:prstGeom>
+        </p:spPr>
+      </p:pic>
     </p:spTree>
     <p:extLst>
       <p:ext uri="{BB962C8B-B14F-4D97-AF65-F5344CB8AC3E}">
@@ -7021,7 +8615,7 @@
 </p:sld>
 </file>
 
-<file path=ppt/slides/slide8.xml><?xml version="1.0" encoding="utf-8"?>
+<file path=ppt/slides/slide9.xml><?xml version="1.0" encoding="utf-8"?>
 <p:sld xmlns:a="http://schemas.openxmlformats.org/drawingml/2006/main" xmlns:r="http://schemas.openxmlformats.org/officeDocument/2006/relationships" xmlns:p="http://schemas.openxmlformats.org/presentationml/2006/main">
   <p:cSld>
     <p:spTree>
@@ -7358,10 +8952,33 @@
               <a:rPr lang="en-US" dirty="0"/>
               <a:t>Façade</a:t>
             </a:r>
-            <a:endParaRPr lang="en-US" dirty="0"/>
           </a:p>
         </p:txBody>
       </p:sp>
+      <p:pic>
+        <p:nvPicPr>
+          <p:cNvPr id="2" name="Picture 1"/>
+          <p:cNvPicPr>
+            <a:picLocks noChangeAspect="1"/>
+          </p:cNvPicPr>
+          <p:nvPr/>
+        </p:nvPicPr>
+        <p:blipFill>
+          <a:blip r:embed="rId2"/>
+          <a:stretch>
+            <a:fillRect/>
+          </a:stretch>
+        </p:blipFill>
+        <p:spPr>
+          <a:xfrm>
+            <a:off x="4297525" y="3312459"/>
+            <a:ext cx="4899646" cy="3507115"/>
+          </a:xfrm>
+          <a:prstGeom prst="rect">
+            <a:avLst/>
+          </a:prstGeom>
+        </p:spPr>
+      </p:pic>
     </p:spTree>
     <p:extLst>
       <p:ext uri="{BB962C8B-B14F-4D97-AF65-F5344CB8AC3E}">
@@ -8239,58 +9856,12 @@
 </file>
 
 <file path=customXml/item1.xml><?xml version="1.0" encoding="utf-8"?>
-<p:properties xmlns:p="http://schemas.microsoft.com/office/2006/metadata/properties" xmlns:xsi="http://www.w3.org/2001/XMLSchema-instance" xmlns:pc="http://schemas.microsoft.com/office/infopath/2007/PartnerControls">
-  <documentManagement>
-    <TrackTaxHTField0 xmlns="2295e2e7-0eeb-498e-8716-217bb2ee6ee3">
-      <Terms xmlns="http://schemas.microsoft.com/office/infopath/2007/PartnerControls"/>
-    </TrackTaxHTField0>
-    <CampaignTaxHTField0 xmlns="2295e2e7-0eeb-498e-8716-217bb2ee6ee3">
-      <Terms xmlns="http://schemas.microsoft.com/office/infopath/2007/PartnerControls"/>
-    </CampaignTaxHTField0>
-    <Event_x0020_End_x0020_Date xmlns="2295e2e7-0eeb-498e-8716-217bb2ee6ee3" xsi:nil="true"/>
-    <Event_x0020_Start_x0020_Date xmlns="2295e2e7-0eeb-498e-8716-217bb2ee6ee3" xsi:nil="true"/>
-    <MS_x0020_Speaker xmlns="2295e2e7-0eeb-498e-8716-217bb2ee6ee3">
-      <UserInfo>
-        <DisplayName/>
-        <AccountId xsi:nil="true"/>
-        <AccountType/>
-      </UserInfo>
-    </MS_x0020_Speaker>
-    <External_x0020_Speaker xmlns="2295e2e7-0eeb-498e-8716-217bb2ee6ee3" xsi:nil="true"/>
-    <Session_x0020_Code xmlns="2295e2e7-0eeb-498e-8716-217bb2ee6ee3" xsi:nil="true"/>
-    <ProductTaxHTField0 xmlns="2295e2e7-0eeb-498e-8716-217bb2ee6ee3">
-      <Terms xmlns="http://schemas.microsoft.com/office/infopath/2007/PartnerControls"/>
-    </ProductTaxHTField0>
-    <Presentation_x0020_Date xmlns="2295e2e7-0eeb-498e-8716-217bb2ee6ee3" xsi:nil="true"/>
-    <Event_x0020_LocationTaxHTField0 xmlns="2295e2e7-0eeb-498e-8716-217bb2ee6ee3">
-      <Terms xmlns="http://schemas.microsoft.com/office/infopath/2007/PartnerControls"/>
-    </Event_x0020_LocationTaxHTField0>
-    <Event1TaxHTField0 xmlns="2295e2e7-0eeb-498e-8716-217bb2ee6ee3">
-      <Terms xmlns="http://schemas.microsoft.com/office/infopath/2007/PartnerControls">
-        <TermInfo xmlns="http://schemas.microsoft.com/office/infopath/2007/PartnerControls">
-          <TermName xmlns="http://schemas.microsoft.com/office/infopath/2007/PartnerControls">Unassigned</TermName>
-          <TermId xmlns="http://schemas.microsoft.com/office/infopath/2007/PartnerControls">e51362f4-782c-41a8-bb7b-e0cfc8669933</TermId>
-        </TermInfo>
-      </Terms>
-    </Event1TaxHTField0>
-    <AudienceTaxHTField0 xmlns="8b529f77-48ab-4581-b468-93f09345b8aa">
-      <Terms xmlns="http://schemas.microsoft.com/office/infopath/2007/PartnerControls"/>
-    </AudienceTaxHTField0>
-    <MS_x0020_Content_x0020_Owner xmlns="2295e2e7-0eeb-498e-8716-217bb2ee6ee3">
-      <UserInfo>
-        <DisplayName/>
-        <AccountId xsi:nil="true"/>
-        <AccountType/>
-      </UserInfo>
-    </MS_x0020_Content_x0020_Owner>
-    <TaxCatchAll xmlns="2295e2e7-0eeb-498e-8716-217bb2ee6ee3">
-      <Value>217</Value>
-    </TaxCatchAll>
-    <Event_x0020_VenueTaxHTField0 xmlns="2295e2e7-0eeb-498e-8716-217bb2ee6ee3">
-      <Terms xmlns="http://schemas.microsoft.com/office/infopath/2007/PartnerControls"/>
-    </Event_x0020_VenueTaxHTField0>
-  </documentManagement>
-</p:properties>
+<?mso-contentType ?>
+<FormTemplates xmlns="http://schemas.microsoft.com/sharepoint/v3/contenttype/forms">
+  <Display>DocumentLibraryForm</Display>
+  <Edit>DocumentLibraryForm</Edit>
+  <New>DocumentLibraryForm</New>
+</FormTemplates>
 </file>
 
 <file path=customXml/item2.xml><?xml version="1.0" encoding="utf-8"?>
@@ -8573,27 +10144,64 @@
 </file>
 
 <file path=customXml/item3.xml><?xml version="1.0" encoding="utf-8"?>
-<?mso-contentType ?>
-<FormTemplates xmlns="http://schemas.microsoft.com/sharepoint/v3/contenttype/forms">
-  <Display>DocumentLibraryForm</Display>
-  <Edit>DocumentLibraryForm</Edit>
-  <New>DocumentLibraryForm</New>
-</FormTemplates>
+<p:properties xmlns:p="http://schemas.microsoft.com/office/2006/metadata/properties" xmlns:xsi="http://www.w3.org/2001/XMLSchema-instance" xmlns:pc="http://schemas.microsoft.com/office/infopath/2007/PartnerControls">
+  <documentManagement>
+    <TrackTaxHTField0 xmlns="2295e2e7-0eeb-498e-8716-217bb2ee6ee3">
+      <Terms xmlns="http://schemas.microsoft.com/office/infopath/2007/PartnerControls"/>
+    </TrackTaxHTField0>
+    <CampaignTaxHTField0 xmlns="2295e2e7-0eeb-498e-8716-217bb2ee6ee3">
+      <Terms xmlns="http://schemas.microsoft.com/office/infopath/2007/PartnerControls"/>
+    </CampaignTaxHTField0>
+    <Event_x0020_End_x0020_Date xmlns="2295e2e7-0eeb-498e-8716-217bb2ee6ee3" xsi:nil="true"/>
+    <Event_x0020_Start_x0020_Date xmlns="2295e2e7-0eeb-498e-8716-217bb2ee6ee3" xsi:nil="true"/>
+    <MS_x0020_Speaker xmlns="2295e2e7-0eeb-498e-8716-217bb2ee6ee3">
+      <UserInfo>
+        <DisplayName/>
+        <AccountId xsi:nil="true"/>
+        <AccountType/>
+      </UserInfo>
+    </MS_x0020_Speaker>
+    <External_x0020_Speaker xmlns="2295e2e7-0eeb-498e-8716-217bb2ee6ee3" xsi:nil="true"/>
+    <Session_x0020_Code xmlns="2295e2e7-0eeb-498e-8716-217bb2ee6ee3" xsi:nil="true"/>
+    <ProductTaxHTField0 xmlns="2295e2e7-0eeb-498e-8716-217bb2ee6ee3">
+      <Terms xmlns="http://schemas.microsoft.com/office/infopath/2007/PartnerControls"/>
+    </ProductTaxHTField0>
+    <Presentation_x0020_Date xmlns="2295e2e7-0eeb-498e-8716-217bb2ee6ee3" xsi:nil="true"/>
+    <Event_x0020_LocationTaxHTField0 xmlns="2295e2e7-0eeb-498e-8716-217bb2ee6ee3">
+      <Terms xmlns="http://schemas.microsoft.com/office/infopath/2007/PartnerControls"/>
+    </Event_x0020_LocationTaxHTField0>
+    <Event1TaxHTField0 xmlns="2295e2e7-0eeb-498e-8716-217bb2ee6ee3">
+      <Terms xmlns="http://schemas.microsoft.com/office/infopath/2007/PartnerControls">
+        <TermInfo xmlns="http://schemas.microsoft.com/office/infopath/2007/PartnerControls">
+          <TermName xmlns="http://schemas.microsoft.com/office/infopath/2007/PartnerControls">Unassigned</TermName>
+          <TermId xmlns="http://schemas.microsoft.com/office/infopath/2007/PartnerControls">e51362f4-782c-41a8-bb7b-e0cfc8669933</TermId>
+        </TermInfo>
+      </Terms>
+    </Event1TaxHTField0>
+    <AudienceTaxHTField0 xmlns="8b529f77-48ab-4581-b468-93f09345b8aa">
+      <Terms xmlns="http://schemas.microsoft.com/office/infopath/2007/PartnerControls"/>
+    </AudienceTaxHTField0>
+    <MS_x0020_Content_x0020_Owner xmlns="2295e2e7-0eeb-498e-8716-217bb2ee6ee3">
+      <UserInfo>
+        <DisplayName/>
+        <AccountId xsi:nil="true"/>
+        <AccountType/>
+      </UserInfo>
+    </MS_x0020_Content_x0020_Owner>
+    <TaxCatchAll xmlns="2295e2e7-0eeb-498e-8716-217bb2ee6ee3">
+      <Value>217</Value>
+    </TaxCatchAll>
+    <Event_x0020_VenueTaxHTField0 xmlns="2295e2e7-0eeb-498e-8716-217bb2ee6ee3">
+      <Terms xmlns="http://schemas.microsoft.com/office/infopath/2007/PartnerControls"/>
+    </Event_x0020_VenueTaxHTField0>
+  </documentManagement>
+</p:properties>
 </file>
 
 <file path=customXml/itemProps1.xml><?xml version="1.0" encoding="utf-8"?>
-<ds:datastoreItem xmlns:ds="http://schemas.openxmlformats.org/officeDocument/2006/customXml" ds:itemID="{F990F116-B58F-4255-B05B-DA3808E0E5C6}">
+<ds:datastoreItem xmlns:ds="http://schemas.openxmlformats.org/officeDocument/2006/customXml" ds:itemID="{758FDAC0-319D-4A54-8D8E-1D42CB1F8004}">
   <ds:schemaRefs>
-    <ds:schemaRef ds:uri="http://purl.org/dc/elements/1.1/"/>
-    <ds:schemaRef ds:uri="http://schemas.microsoft.com/office/2006/metadata/properties"/>
-    <ds:schemaRef ds:uri="http://purl.org/dc/terms/"/>
-    <ds:schemaRef ds:uri="2295e2e7-0eeb-498e-8716-217bb2ee6ee3"/>
-    <ds:schemaRef ds:uri="http://purl.org/dc/dcmitype/"/>
-    <ds:schemaRef ds:uri="http://schemas.microsoft.com/office/2006/documentManagement/types"/>
-    <ds:schemaRef ds:uri="http://schemas.microsoft.com/office/infopath/2007/PartnerControls"/>
-    <ds:schemaRef ds:uri="http://schemas.openxmlformats.org/package/2006/metadata/core-properties"/>
-    <ds:schemaRef ds:uri="8b529f77-48ab-4581-b468-93f09345b8aa"/>
-    <ds:schemaRef ds:uri="http://www.w3.org/XML/1998/namespace"/>
+    <ds:schemaRef ds:uri="http://schemas.microsoft.com/sharepoint/v3/contenttype/forms"/>
   </ds:schemaRefs>
 </ds:datastoreItem>
 </file>
@@ -8618,9 +10226,18 @@
 </file>
 
 <file path=customXml/itemProps3.xml><?xml version="1.0" encoding="utf-8"?>
-<ds:datastoreItem xmlns:ds="http://schemas.openxmlformats.org/officeDocument/2006/customXml" ds:itemID="{758FDAC0-319D-4A54-8D8E-1D42CB1F8004}">
+<ds:datastoreItem xmlns:ds="http://schemas.openxmlformats.org/officeDocument/2006/customXml" ds:itemID="{F990F116-B58F-4255-B05B-DA3808E0E5C6}">
   <ds:schemaRefs>
-    <ds:schemaRef ds:uri="http://schemas.microsoft.com/sharepoint/v3/contenttype/forms"/>
+    <ds:schemaRef ds:uri="http://purl.org/dc/elements/1.1/"/>
+    <ds:schemaRef ds:uri="http://schemas.microsoft.com/office/2006/metadata/properties"/>
+    <ds:schemaRef ds:uri="http://purl.org/dc/terms/"/>
+    <ds:schemaRef ds:uri="2295e2e7-0eeb-498e-8716-217bb2ee6ee3"/>
+    <ds:schemaRef ds:uri="http://purl.org/dc/dcmitype/"/>
+    <ds:schemaRef ds:uri="http://schemas.microsoft.com/office/2006/documentManagement/types"/>
+    <ds:schemaRef ds:uri="http://schemas.microsoft.com/office/infopath/2007/PartnerControls"/>
+    <ds:schemaRef ds:uri="http://schemas.openxmlformats.org/package/2006/metadata/core-properties"/>
+    <ds:schemaRef ds:uri="8b529f77-48ab-4581-b468-93f09345b8aa"/>
+    <ds:schemaRef ds:uri="http://www.w3.org/XML/1998/namespace"/>
   </ds:schemaRefs>
 </ds:datastoreItem>
 </file>
</xml_diff>